<commit_message>
Add title slide and placeholders
</commit_message>
<xml_diff>
--- a/slides.pptx
+++ b/slides.pptx
@@ -5,9 +5,9 @@
     <p:sldMasterId id="2147483648" r:id="rId1"/>
   </p:sldMasterIdLst>
   <p:sldIdLst>
-    <p:sldId id="256" r:id="rId2"/>
-    <p:sldId id="257" r:id="rId3"/>
-    <p:sldId id="258" r:id="rId4"/>
+    <p:sldId id="257" r:id="rId2"/>
+    <p:sldId id="258" r:id="rId3"/>
+    <p:sldId id="259" r:id="rId4"/>
   </p:sldIdLst>
   <p:sldSz cx="12192000" cy="6858000"/>
   <p:notesSz cx="6858000" cy="9144000"/>
@@ -106,6 +106,11 @@
       </a:defRPr>
     </a:lvl9pPr>
   </p:defaultTextStyle>
+  <p:extLst>
+    <p:ext uri="{EFAFB233-063F-42B5-8137-9DF3F51BA10A}">
+      <p15:sldGuideLst xmlns:p15="http://schemas.microsoft.com/office/powerpoint/2012/main"/>
+    </p:ext>
+  </p:extLst>
 </p:presentation>
 </file>
 
@@ -151,10 +156,9 @@
           </a:lstStyle>
           <a:p>
             <a:r>
-              <a:rPr lang="en-US" smtClean="0"/>
+              <a:rPr lang="en-US"/>
               <a:t>Click to edit Master title style</a:t>
             </a:r>
-            <a:endParaRPr lang="en-US"/>
           </a:p>
         </p:txBody>
       </p:sp>
@@ -216,10 +220,9 @@
           </a:lstStyle>
           <a:p>
             <a:r>
-              <a:rPr lang="en-US" smtClean="0"/>
+              <a:rPr lang="en-US"/>
               <a:t>Click to edit Master subtitle style</a:t>
             </a:r>
-            <a:endParaRPr lang="en-US"/>
           </a:p>
         </p:txBody>
       </p:sp>
@@ -240,7 +243,7 @@
           <a:p>
             <a:fld id="{472417AA-5186-4DA5-8FC7-94E6CE6234FF}" type="datetimeFigureOut">
               <a:rPr lang="en-US" smtClean="0"/>
-              <a:t>10/11/2021</a:t>
+              <a:t>10/13/21</a:t>
             </a:fld>
             <a:endParaRPr lang="en-US"/>
           </a:p>
@@ -334,10 +337,9 @@
           <a:lstStyle/>
           <a:p>
             <a:r>
-              <a:rPr lang="en-US" smtClean="0"/>
+              <a:rPr lang="en-US"/>
               <a:t>Click to edit Master title style</a:t>
             </a:r>
-            <a:endParaRPr lang="en-US"/>
           </a:p>
         </p:txBody>
       </p:sp>
@@ -358,38 +360,37 @@
           <a:p>
             <a:pPr lvl="0"/>
             <a:r>
-              <a:rPr lang="en-US" smtClean="0"/>
+              <a:rPr lang="en-US"/>
               <a:t>Edit Master text styles</a:t>
             </a:r>
           </a:p>
           <a:p>
             <a:pPr lvl="1"/>
             <a:r>
-              <a:rPr lang="en-US" smtClean="0"/>
+              <a:rPr lang="en-US"/>
               <a:t>Second level</a:t>
             </a:r>
           </a:p>
           <a:p>
             <a:pPr lvl="2"/>
             <a:r>
-              <a:rPr lang="en-US" smtClean="0"/>
+              <a:rPr lang="en-US"/>
               <a:t>Third level</a:t>
             </a:r>
           </a:p>
           <a:p>
             <a:pPr lvl="3"/>
             <a:r>
-              <a:rPr lang="en-US" smtClean="0"/>
+              <a:rPr lang="en-US"/>
               <a:t>Fourth level</a:t>
             </a:r>
           </a:p>
           <a:p>
             <a:pPr lvl="4"/>
             <a:r>
-              <a:rPr lang="en-US" smtClean="0"/>
+              <a:rPr lang="en-US"/>
               <a:t>Fifth level</a:t>
             </a:r>
-            <a:endParaRPr lang="en-US"/>
           </a:p>
         </p:txBody>
       </p:sp>
@@ -410,7 +411,7 @@
           <a:p>
             <a:fld id="{472417AA-5186-4DA5-8FC7-94E6CE6234FF}" type="datetimeFigureOut">
               <a:rPr lang="en-US" smtClean="0"/>
-              <a:t>10/11/2021</a:t>
+              <a:t>10/13/21</a:t>
             </a:fld>
             <a:endParaRPr lang="en-US"/>
           </a:p>
@@ -509,10 +510,9 @@
           <a:lstStyle/>
           <a:p>
             <a:r>
-              <a:rPr lang="en-US" smtClean="0"/>
+              <a:rPr lang="en-US"/>
               <a:t>Click to edit Master title style</a:t>
             </a:r>
-            <a:endParaRPr lang="en-US"/>
           </a:p>
         </p:txBody>
       </p:sp>
@@ -538,38 +538,37 @@
           <a:p>
             <a:pPr lvl="0"/>
             <a:r>
-              <a:rPr lang="en-US" smtClean="0"/>
+              <a:rPr lang="en-US"/>
               <a:t>Edit Master text styles</a:t>
             </a:r>
           </a:p>
           <a:p>
             <a:pPr lvl="1"/>
             <a:r>
-              <a:rPr lang="en-US" smtClean="0"/>
+              <a:rPr lang="en-US"/>
               <a:t>Second level</a:t>
             </a:r>
           </a:p>
           <a:p>
             <a:pPr lvl="2"/>
             <a:r>
-              <a:rPr lang="en-US" smtClean="0"/>
+              <a:rPr lang="en-US"/>
               <a:t>Third level</a:t>
             </a:r>
           </a:p>
           <a:p>
             <a:pPr lvl="3"/>
             <a:r>
-              <a:rPr lang="en-US" smtClean="0"/>
+              <a:rPr lang="en-US"/>
               <a:t>Fourth level</a:t>
             </a:r>
           </a:p>
           <a:p>
             <a:pPr lvl="4"/>
             <a:r>
-              <a:rPr lang="en-US" smtClean="0"/>
+              <a:rPr lang="en-US"/>
               <a:t>Fifth level</a:t>
             </a:r>
-            <a:endParaRPr lang="en-US"/>
           </a:p>
         </p:txBody>
       </p:sp>
@@ -590,7 +589,7 @@
           <a:p>
             <a:fld id="{472417AA-5186-4DA5-8FC7-94E6CE6234FF}" type="datetimeFigureOut">
               <a:rPr lang="en-US" smtClean="0"/>
-              <a:t>10/11/2021</a:t>
+              <a:t>10/13/21</a:t>
             </a:fld>
             <a:endParaRPr lang="en-US"/>
           </a:p>
@@ -684,10 +683,9 @@
           <a:lstStyle/>
           <a:p>
             <a:r>
-              <a:rPr lang="en-US" smtClean="0"/>
+              <a:rPr lang="en-US"/>
               <a:t>Click to edit Master title style</a:t>
             </a:r>
-            <a:endParaRPr lang="en-US"/>
           </a:p>
         </p:txBody>
       </p:sp>
@@ -708,38 +706,37 @@
           <a:p>
             <a:pPr lvl="0"/>
             <a:r>
-              <a:rPr lang="en-US" smtClean="0"/>
+              <a:rPr lang="en-US"/>
               <a:t>Edit Master text styles</a:t>
             </a:r>
           </a:p>
           <a:p>
             <a:pPr lvl="1"/>
             <a:r>
-              <a:rPr lang="en-US" smtClean="0"/>
+              <a:rPr lang="en-US"/>
               <a:t>Second level</a:t>
             </a:r>
           </a:p>
           <a:p>
             <a:pPr lvl="2"/>
             <a:r>
-              <a:rPr lang="en-US" smtClean="0"/>
+              <a:rPr lang="en-US"/>
               <a:t>Third level</a:t>
             </a:r>
           </a:p>
           <a:p>
             <a:pPr lvl="3"/>
             <a:r>
-              <a:rPr lang="en-US" smtClean="0"/>
+              <a:rPr lang="en-US"/>
               <a:t>Fourth level</a:t>
             </a:r>
           </a:p>
           <a:p>
             <a:pPr lvl="4"/>
             <a:r>
-              <a:rPr lang="en-US" smtClean="0"/>
+              <a:rPr lang="en-US"/>
               <a:t>Fifth level</a:t>
             </a:r>
-            <a:endParaRPr lang="en-US"/>
           </a:p>
         </p:txBody>
       </p:sp>
@@ -760,7 +757,7 @@
           <a:p>
             <a:fld id="{472417AA-5186-4DA5-8FC7-94E6CE6234FF}" type="datetimeFigureOut">
               <a:rPr lang="en-US" smtClean="0"/>
-              <a:t>10/11/2021</a:t>
+              <a:t>10/13/21</a:t>
             </a:fld>
             <a:endParaRPr lang="en-US"/>
           </a:p>
@@ -863,10 +860,9 @@
           </a:lstStyle>
           <a:p>
             <a:r>
-              <a:rPr lang="en-US" smtClean="0"/>
+              <a:rPr lang="en-US"/>
               <a:t>Click to edit Master title style</a:t>
             </a:r>
-            <a:endParaRPr lang="en-US"/>
           </a:p>
         </p:txBody>
       </p:sp>
@@ -983,7 +979,7 @@
           <a:p>
             <a:pPr lvl="0"/>
             <a:r>
-              <a:rPr lang="en-US" smtClean="0"/>
+              <a:rPr lang="en-US"/>
               <a:t>Edit Master text styles</a:t>
             </a:r>
           </a:p>
@@ -1006,7 +1002,7 @@
           <a:p>
             <a:fld id="{472417AA-5186-4DA5-8FC7-94E6CE6234FF}" type="datetimeFigureOut">
               <a:rPr lang="en-US" smtClean="0"/>
-              <a:t>10/11/2021</a:t>
+              <a:t>10/13/21</a:t>
             </a:fld>
             <a:endParaRPr lang="en-US"/>
           </a:p>
@@ -1100,10 +1096,9 @@
           <a:lstStyle/>
           <a:p>
             <a:r>
-              <a:rPr lang="en-US" smtClean="0"/>
+              <a:rPr lang="en-US"/>
               <a:t>Click to edit Master title style</a:t>
             </a:r>
-            <a:endParaRPr lang="en-US"/>
           </a:p>
         </p:txBody>
       </p:sp>
@@ -1129,38 +1124,37 @@
           <a:p>
             <a:pPr lvl="0"/>
             <a:r>
-              <a:rPr lang="en-US" smtClean="0"/>
+              <a:rPr lang="en-US"/>
               <a:t>Edit Master text styles</a:t>
             </a:r>
           </a:p>
           <a:p>
             <a:pPr lvl="1"/>
             <a:r>
-              <a:rPr lang="en-US" smtClean="0"/>
+              <a:rPr lang="en-US"/>
               <a:t>Second level</a:t>
             </a:r>
           </a:p>
           <a:p>
             <a:pPr lvl="2"/>
             <a:r>
-              <a:rPr lang="en-US" smtClean="0"/>
+              <a:rPr lang="en-US"/>
               <a:t>Third level</a:t>
             </a:r>
           </a:p>
           <a:p>
             <a:pPr lvl="3"/>
             <a:r>
-              <a:rPr lang="en-US" smtClean="0"/>
+              <a:rPr lang="en-US"/>
               <a:t>Fourth level</a:t>
             </a:r>
           </a:p>
           <a:p>
             <a:pPr lvl="4"/>
             <a:r>
-              <a:rPr lang="en-US" smtClean="0"/>
+              <a:rPr lang="en-US"/>
               <a:t>Fifth level</a:t>
             </a:r>
-            <a:endParaRPr lang="en-US"/>
           </a:p>
         </p:txBody>
       </p:sp>
@@ -1186,38 +1180,37 @@
           <a:p>
             <a:pPr lvl="0"/>
             <a:r>
-              <a:rPr lang="en-US" smtClean="0"/>
+              <a:rPr lang="en-US"/>
               <a:t>Edit Master text styles</a:t>
             </a:r>
           </a:p>
           <a:p>
             <a:pPr lvl="1"/>
             <a:r>
-              <a:rPr lang="en-US" smtClean="0"/>
+              <a:rPr lang="en-US"/>
               <a:t>Second level</a:t>
             </a:r>
           </a:p>
           <a:p>
             <a:pPr lvl="2"/>
             <a:r>
-              <a:rPr lang="en-US" smtClean="0"/>
+              <a:rPr lang="en-US"/>
               <a:t>Third level</a:t>
             </a:r>
           </a:p>
           <a:p>
             <a:pPr lvl="3"/>
             <a:r>
-              <a:rPr lang="en-US" smtClean="0"/>
+              <a:rPr lang="en-US"/>
               <a:t>Fourth level</a:t>
             </a:r>
           </a:p>
           <a:p>
             <a:pPr lvl="4"/>
             <a:r>
-              <a:rPr lang="en-US" smtClean="0"/>
+              <a:rPr lang="en-US"/>
               <a:t>Fifth level</a:t>
             </a:r>
-            <a:endParaRPr lang="en-US"/>
           </a:p>
         </p:txBody>
       </p:sp>
@@ -1238,7 +1231,7 @@
           <a:p>
             <a:fld id="{472417AA-5186-4DA5-8FC7-94E6CE6234FF}" type="datetimeFigureOut">
               <a:rPr lang="en-US" smtClean="0"/>
-              <a:t>10/11/2021</a:t>
+              <a:t>10/13/21</a:t>
             </a:fld>
             <a:endParaRPr lang="en-US"/>
           </a:p>
@@ -1337,10 +1330,9 @@
           <a:lstStyle/>
           <a:p>
             <a:r>
-              <a:rPr lang="en-US" smtClean="0"/>
+              <a:rPr lang="en-US"/>
               <a:t>Click to edit Master title style</a:t>
             </a:r>
-            <a:endParaRPr lang="en-US"/>
           </a:p>
         </p:txBody>
       </p:sp>
@@ -1403,7 +1395,7 @@
           <a:p>
             <a:pPr lvl="0"/>
             <a:r>
-              <a:rPr lang="en-US" smtClean="0"/>
+              <a:rPr lang="en-US"/>
               <a:t>Edit Master text styles</a:t>
             </a:r>
           </a:p>
@@ -1431,38 +1423,37 @@
           <a:p>
             <a:pPr lvl="0"/>
             <a:r>
-              <a:rPr lang="en-US" smtClean="0"/>
+              <a:rPr lang="en-US"/>
               <a:t>Edit Master text styles</a:t>
             </a:r>
           </a:p>
           <a:p>
             <a:pPr lvl="1"/>
             <a:r>
-              <a:rPr lang="en-US" smtClean="0"/>
+              <a:rPr lang="en-US"/>
               <a:t>Second level</a:t>
             </a:r>
           </a:p>
           <a:p>
             <a:pPr lvl="2"/>
             <a:r>
-              <a:rPr lang="en-US" smtClean="0"/>
+              <a:rPr lang="en-US"/>
               <a:t>Third level</a:t>
             </a:r>
           </a:p>
           <a:p>
             <a:pPr lvl="3"/>
             <a:r>
-              <a:rPr lang="en-US" smtClean="0"/>
+              <a:rPr lang="en-US"/>
               <a:t>Fourth level</a:t>
             </a:r>
           </a:p>
           <a:p>
             <a:pPr lvl="4"/>
             <a:r>
-              <a:rPr lang="en-US" smtClean="0"/>
+              <a:rPr lang="en-US"/>
               <a:t>Fifth level</a:t>
             </a:r>
-            <a:endParaRPr lang="en-US"/>
           </a:p>
         </p:txBody>
       </p:sp>
@@ -1525,7 +1516,7 @@
           <a:p>
             <a:pPr lvl="0"/>
             <a:r>
-              <a:rPr lang="en-US" smtClean="0"/>
+              <a:rPr lang="en-US"/>
               <a:t>Edit Master text styles</a:t>
             </a:r>
           </a:p>
@@ -1553,38 +1544,37 @@
           <a:p>
             <a:pPr lvl="0"/>
             <a:r>
-              <a:rPr lang="en-US" smtClean="0"/>
+              <a:rPr lang="en-US"/>
               <a:t>Edit Master text styles</a:t>
             </a:r>
           </a:p>
           <a:p>
             <a:pPr lvl="1"/>
             <a:r>
-              <a:rPr lang="en-US" smtClean="0"/>
+              <a:rPr lang="en-US"/>
               <a:t>Second level</a:t>
             </a:r>
           </a:p>
           <a:p>
             <a:pPr lvl="2"/>
             <a:r>
-              <a:rPr lang="en-US" smtClean="0"/>
+              <a:rPr lang="en-US"/>
               <a:t>Third level</a:t>
             </a:r>
           </a:p>
           <a:p>
             <a:pPr lvl="3"/>
             <a:r>
-              <a:rPr lang="en-US" smtClean="0"/>
+              <a:rPr lang="en-US"/>
               <a:t>Fourth level</a:t>
             </a:r>
           </a:p>
           <a:p>
             <a:pPr lvl="4"/>
             <a:r>
-              <a:rPr lang="en-US" smtClean="0"/>
+              <a:rPr lang="en-US"/>
               <a:t>Fifth level</a:t>
             </a:r>
-            <a:endParaRPr lang="en-US"/>
           </a:p>
         </p:txBody>
       </p:sp>
@@ -1605,7 +1595,7 @@
           <a:p>
             <a:fld id="{472417AA-5186-4DA5-8FC7-94E6CE6234FF}" type="datetimeFigureOut">
               <a:rPr lang="en-US" smtClean="0"/>
-              <a:t>10/11/2021</a:t>
+              <a:t>10/13/21</a:t>
             </a:fld>
             <a:endParaRPr lang="en-US"/>
           </a:p>
@@ -1699,10 +1689,9 @@
           <a:lstStyle/>
           <a:p>
             <a:r>
-              <a:rPr lang="en-US" smtClean="0"/>
+              <a:rPr lang="en-US"/>
               <a:t>Click to edit Master title style</a:t>
             </a:r>
-            <a:endParaRPr lang="en-US"/>
           </a:p>
         </p:txBody>
       </p:sp>
@@ -1723,7 +1712,7 @@
           <a:p>
             <a:fld id="{472417AA-5186-4DA5-8FC7-94E6CE6234FF}" type="datetimeFigureOut">
               <a:rPr lang="en-US" smtClean="0"/>
-              <a:t>10/11/2021</a:t>
+              <a:t>10/13/21</a:t>
             </a:fld>
             <a:endParaRPr lang="en-US"/>
           </a:p>
@@ -1818,7 +1807,7 @@
           <a:p>
             <a:fld id="{472417AA-5186-4DA5-8FC7-94E6CE6234FF}" type="datetimeFigureOut">
               <a:rPr lang="en-US" smtClean="0"/>
-              <a:t>10/11/2021</a:t>
+              <a:t>10/13/21</a:t>
             </a:fld>
             <a:endParaRPr lang="en-US"/>
           </a:p>
@@ -1921,10 +1910,9 @@
           </a:lstStyle>
           <a:p>
             <a:r>
-              <a:rPr lang="en-US" smtClean="0"/>
+              <a:rPr lang="en-US"/>
               <a:t>Click to edit Master title style</a:t>
             </a:r>
-            <a:endParaRPr lang="en-US"/>
           </a:p>
         </p:txBody>
       </p:sp>
@@ -1978,38 +1966,37 @@
           <a:p>
             <a:pPr lvl="0"/>
             <a:r>
-              <a:rPr lang="en-US" smtClean="0"/>
+              <a:rPr lang="en-US"/>
               <a:t>Edit Master text styles</a:t>
             </a:r>
           </a:p>
           <a:p>
             <a:pPr lvl="1"/>
             <a:r>
-              <a:rPr lang="en-US" smtClean="0"/>
+              <a:rPr lang="en-US"/>
               <a:t>Second level</a:t>
             </a:r>
           </a:p>
           <a:p>
             <a:pPr lvl="2"/>
             <a:r>
-              <a:rPr lang="en-US" smtClean="0"/>
+              <a:rPr lang="en-US"/>
               <a:t>Third level</a:t>
             </a:r>
           </a:p>
           <a:p>
             <a:pPr lvl="3"/>
             <a:r>
-              <a:rPr lang="en-US" smtClean="0"/>
+              <a:rPr lang="en-US"/>
               <a:t>Fourth level</a:t>
             </a:r>
           </a:p>
           <a:p>
             <a:pPr lvl="4"/>
             <a:r>
-              <a:rPr lang="en-US" smtClean="0"/>
+              <a:rPr lang="en-US"/>
               <a:t>Fifth level</a:t>
             </a:r>
-            <a:endParaRPr lang="en-US"/>
           </a:p>
         </p:txBody>
       </p:sp>
@@ -2072,7 +2059,7 @@
           <a:p>
             <a:pPr lvl="0"/>
             <a:r>
-              <a:rPr lang="en-US" smtClean="0"/>
+              <a:rPr lang="en-US"/>
               <a:t>Edit Master text styles</a:t>
             </a:r>
           </a:p>
@@ -2095,7 +2082,7 @@
           <a:p>
             <a:fld id="{472417AA-5186-4DA5-8FC7-94E6CE6234FF}" type="datetimeFigureOut">
               <a:rPr lang="en-US" smtClean="0"/>
-              <a:t>10/11/2021</a:t>
+              <a:t>10/13/21</a:t>
             </a:fld>
             <a:endParaRPr lang="en-US"/>
           </a:p>
@@ -2198,10 +2185,9 @@
           </a:lstStyle>
           <a:p>
             <a:r>
-              <a:rPr lang="en-US" smtClean="0"/>
+              <a:rPr lang="en-US"/>
               <a:t>Click to edit Master title style</a:t>
             </a:r>
-            <a:endParaRPr lang="en-US"/>
           </a:p>
         </p:txBody>
       </p:sp>
@@ -2325,7 +2311,7 @@
           <a:p>
             <a:pPr lvl="0"/>
             <a:r>
-              <a:rPr lang="en-US" smtClean="0"/>
+              <a:rPr lang="en-US"/>
               <a:t>Edit Master text styles</a:t>
             </a:r>
           </a:p>
@@ -2348,7 +2334,7 @@
           <a:p>
             <a:fld id="{472417AA-5186-4DA5-8FC7-94E6CE6234FF}" type="datetimeFigureOut">
               <a:rPr lang="en-US" smtClean="0"/>
-              <a:t>10/11/2021</a:t>
+              <a:t>10/13/21</a:t>
             </a:fld>
             <a:endParaRPr lang="en-US"/>
           </a:p>
@@ -2457,10 +2443,9 @@
           <a:lstStyle/>
           <a:p>
             <a:r>
-              <a:rPr lang="en-US" smtClean="0"/>
+              <a:rPr lang="en-US"/>
               <a:t>Click to edit Master title style</a:t>
             </a:r>
-            <a:endParaRPr lang="en-US"/>
           </a:p>
         </p:txBody>
       </p:sp>
@@ -2491,38 +2476,37 @@
           <a:p>
             <a:pPr lvl="0"/>
             <a:r>
-              <a:rPr lang="en-US" smtClean="0"/>
+              <a:rPr lang="en-US"/>
               <a:t>Edit Master text styles</a:t>
             </a:r>
           </a:p>
           <a:p>
             <a:pPr lvl="1"/>
             <a:r>
-              <a:rPr lang="en-US" smtClean="0"/>
+              <a:rPr lang="en-US"/>
               <a:t>Second level</a:t>
             </a:r>
           </a:p>
           <a:p>
             <a:pPr lvl="2"/>
             <a:r>
-              <a:rPr lang="en-US" smtClean="0"/>
+              <a:rPr lang="en-US"/>
               <a:t>Third level</a:t>
             </a:r>
           </a:p>
           <a:p>
             <a:pPr lvl="3"/>
             <a:r>
-              <a:rPr lang="en-US" smtClean="0"/>
+              <a:rPr lang="en-US"/>
               <a:t>Fourth level</a:t>
             </a:r>
           </a:p>
           <a:p>
             <a:pPr lvl="4"/>
             <a:r>
-              <a:rPr lang="en-US" smtClean="0"/>
+              <a:rPr lang="en-US"/>
               <a:t>Fifth level</a:t>
             </a:r>
-            <a:endParaRPr lang="en-US"/>
           </a:p>
         </p:txBody>
       </p:sp>
@@ -2561,7 +2545,7 @@
           <a:p>
             <a:fld id="{472417AA-5186-4DA5-8FC7-94E6CE6234FF}" type="datetimeFigureOut">
               <a:rPr lang="en-US" smtClean="0"/>
-              <a:t>10/11/2021</a:t>
+              <a:t>10/13/21</a:t>
             </a:fld>
             <a:endParaRPr lang="en-US"/>
           </a:p>
@@ -2952,6 +2936,20 @@
 <file path=ppt/slides/slide1.xml><?xml version="1.0" encoding="utf-8"?>
 <p:sld xmlns:a="http://schemas.openxmlformats.org/drawingml/2006/main" xmlns:r="http://schemas.openxmlformats.org/officeDocument/2006/relationships" xmlns:p="http://schemas.openxmlformats.org/presentationml/2006/main">
   <p:cSld>
+    <p:bg>
+      <p:bgPr>
+        <a:blipFill dpi="0" rotWithShape="1">
+          <a:blip r:embed="rId2">
+            <a:lum/>
+          </a:blip>
+          <a:srcRect/>
+          <a:stretch>
+            <a:fillRect/>
+          </a:stretch>
+        </a:blipFill>
+        <a:effectLst/>
+      </p:bgPr>
+    </p:bg>
     <p:spTree>
       <p:nvGrpSpPr>
         <p:cNvPr id="1" name=""/>
@@ -2968,82 +2966,20 @@
       </p:grpSpPr>
       <p:sp>
         <p:nvSpPr>
-          <p:cNvPr id="2" name="Title 1"/>
-          <p:cNvSpPr>
-            <a:spLocks noGrp="1"/>
-          </p:cNvSpPr>
-          <p:nvPr>
-            <p:ph type="ctrTitle"/>
-          </p:nvPr>
-        </p:nvSpPr>
-        <p:spPr/>
-        <p:txBody>
-          <a:bodyPr/>
-          <a:lstStyle/>
-          <a:p>
-            <a:endParaRPr lang="en-US"/>
-          </a:p>
-        </p:txBody>
-      </p:sp>
-      <p:sp>
-        <p:nvSpPr>
-          <p:cNvPr id="3" name="Subtitle 2"/>
-          <p:cNvSpPr>
-            <a:spLocks noGrp="1"/>
-          </p:cNvSpPr>
-          <p:nvPr>
-            <p:ph type="subTitle" idx="1"/>
-          </p:nvPr>
-        </p:nvSpPr>
-        <p:spPr/>
-        <p:txBody>
-          <a:bodyPr/>
-          <a:lstStyle/>
-          <a:p>
-            <a:endParaRPr lang="en-US"/>
-          </a:p>
-        </p:txBody>
-      </p:sp>
-      <p:pic>
-        <p:nvPicPr>
-          <p:cNvPr id="4" name="Picture 3"/>
-          <p:cNvPicPr>
-            <a:picLocks noChangeAspect="1"/>
-          </p:cNvPicPr>
-          <p:nvPr/>
-        </p:nvPicPr>
-        <p:blipFill>
-          <a:blip r:embed="rId2">
+          <p:cNvPr id="2" name="TextBox 1">
             <a:extLst>
-              <a:ext uri="{28A0092B-C50C-407E-A947-70E740481C1C}">
-                <a14:useLocalDpi xmlns:a14="http://schemas.microsoft.com/office/drawing/2010/main" val="0"/>
+              <a:ext uri="{FF2B5EF4-FFF2-40B4-BE49-F238E27FC236}">
+                <a16:creationId xmlns:a16="http://schemas.microsoft.com/office/drawing/2014/main" id="{E97D5640-866E-434D-99D3-CDF94855533F}"/>
               </a:ext>
             </a:extLst>
-          </a:blip>
-          <a:stretch>
-            <a:fillRect/>
-          </a:stretch>
-        </p:blipFill>
+          </p:cNvPr>
+          <p:cNvSpPr txBox="1"/>
+          <p:nvPr/>
+        </p:nvSpPr>
         <p:spPr>
           <a:xfrm>
-            <a:off x="0" y="0"/>
-            <a:ext cx="12192000" cy="6858000"/>
-          </a:xfrm>
-          <a:prstGeom prst="rect">
-            <a:avLst/>
-          </a:prstGeom>
-        </p:spPr>
-      </p:pic>
-      <p:sp>
-        <p:nvSpPr>
-          <p:cNvPr id="5" name="TextBox 4"/>
-          <p:cNvSpPr txBox="1"/>
-          <p:nvPr/>
-        </p:nvSpPr>
-        <p:spPr>
-          <a:xfrm>
-            <a:off x="2800350" y="2994660"/>
-            <a:ext cx="5602880" cy="369332"/>
+            <a:off x="684974" y="1262767"/>
+            <a:ext cx="7220246" cy="1323439"/>
           </a:xfrm>
           <a:prstGeom prst="rect">
             <a:avLst/>
@@ -3057,25 +2993,194 @@
           <a:lstStyle/>
           <a:p>
             <a:r>
-              <a:rPr lang="en-US" dirty="0" smtClean="0">
+              <a:rPr lang="en-US" sz="4000" b="1" dirty="0">
                 <a:solidFill>
                   <a:schemeClr val="bg1"/>
                 </a:solidFill>
+                <a:latin typeface="Avenir Next Demi Bold" panose="020B0503020202020204" pitchFamily="34" charset="0"/>
               </a:rPr>
-              <a:t>Building capacity to provide in-demand data analysis skills</a:t>
-            </a:r>
-            <a:endParaRPr lang="en-US" dirty="0">
+              <a:t>Building capacity to provide</a:t>
+            </a:r>
+          </a:p>
+          <a:p>
+            <a:r>
+              <a:rPr lang="en-US" sz="4000" b="1" dirty="0">
+                <a:solidFill>
+                  <a:schemeClr val="bg1"/>
+                </a:solidFill>
+                <a:latin typeface="Avenir Next Demi Bold" panose="020B0503020202020204" pitchFamily="34" charset="0"/>
+              </a:rPr>
+              <a:t>in-demand data analysis skills</a:t>
+            </a:r>
+          </a:p>
+        </p:txBody>
+      </p:sp>
+      <p:sp>
+        <p:nvSpPr>
+          <p:cNvPr id="3" name="TextBox 2">
+            <a:extLst>
+              <a:ext uri="{FF2B5EF4-FFF2-40B4-BE49-F238E27FC236}">
+                <a16:creationId xmlns:a16="http://schemas.microsoft.com/office/drawing/2014/main" id="{D1347224-7EF2-864B-851A-DE131E19ED82}"/>
+              </a:ext>
+            </a:extLst>
+          </p:cNvPr>
+          <p:cNvSpPr txBox="1"/>
+          <p:nvPr/>
+        </p:nvSpPr>
+        <p:spPr>
+          <a:xfrm>
+            <a:off x="9139842" y="3806464"/>
+            <a:ext cx="2154051" cy="1569660"/>
+          </a:xfrm>
+          <a:prstGeom prst="rect">
+            <a:avLst/>
+          </a:prstGeom>
+          <a:noFill/>
+        </p:spPr>
+        <p:txBody>
+          <a:bodyPr wrap="none" rtlCol="0">
+            <a:spAutoFit/>
+          </a:bodyPr>
+          <a:lstStyle/>
+          <a:p>
+            <a:pPr algn="r"/>
+            <a:r>
+              <a:rPr lang="en-US" sz="2400" dirty="0">
+                <a:solidFill>
+                  <a:schemeClr val="bg1"/>
+                </a:solidFill>
+                <a:latin typeface="Avenir Next Medium" panose="020B0503020202020204" pitchFamily="34" charset="0"/>
+              </a:rPr>
+              <a:t>Kirsten </a:t>
+            </a:r>
+            <a:r>
+              <a:rPr lang="en-US" sz="2400" dirty="0" err="1">
+                <a:solidFill>
+                  <a:schemeClr val="bg1"/>
+                </a:solidFill>
+                <a:latin typeface="Avenir Next Medium" panose="020B0503020202020204" pitchFamily="34" charset="0"/>
+              </a:rPr>
+              <a:t>Burcat</a:t>
+            </a:r>
+            <a:endParaRPr lang="en-US" sz="2400" dirty="0">
               <a:solidFill>
                 <a:schemeClr val="bg1"/>
               </a:solidFill>
+              <a:latin typeface="Avenir Next Medium" panose="020B0503020202020204" pitchFamily="34" charset="0"/>
             </a:endParaRPr>
+          </a:p>
+          <a:p>
+            <a:pPr algn="r"/>
+            <a:r>
+              <a:rPr lang="en-US" sz="2400" dirty="0">
+                <a:solidFill>
+                  <a:schemeClr val="bg1"/>
+                </a:solidFill>
+                <a:latin typeface="Avenir Next Medium" panose="020B0503020202020204" pitchFamily="34" charset="0"/>
+              </a:rPr>
+              <a:t>JP </a:t>
+            </a:r>
+            <a:r>
+              <a:rPr lang="en-US" sz="2400" dirty="0" err="1">
+                <a:solidFill>
+                  <a:schemeClr val="bg1"/>
+                </a:solidFill>
+                <a:latin typeface="Avenir Next Medium" panose="020B0503020202020204" pitchFamily="34" charset="0"/>
+              </a:rPr>
+              <a:t>Courneya</a:t>
+            </a:r>
+            <a:endParaRPr lang="en-US" sz="2400" dirty="0">
+              <a:solidFill>
+                <a:schemeClr val="bg1"/>
+              </a:solidFill>
+              <a:latin typeface="Avenir Next Medium" panose="020B0503020202020204" pitchFamily="34" charset="0"/>
+            </a:endParaRPr>
+          </a:p>
+          <a:p>
+            <a:pPr algn="r"/>
+            <a:r>
+              <a:rPr lang="en-US" sz="2400" dirty="0">
+                <a:solidFill>
+                  <a:schemeClr val="bg1"/>
+                </a:solidFill>
+                <a:latin typeface="Avenir Next Medium" panose="020B0503020202020204" pitchFamily="34" charset="0"/>
+              </a:rPr>
+              <a:t>Amy Yarnell</a:t>
+            </a:r>
+          </a:p>
+          <a:p>
+            <a:pPr algn="r"/>
+            <a:r>
+              <a:rPr lang="en-US" sz="2400" dirty="0">
+                <a:solidFill>
+                  <a:schemeClr val="bg1"/>
+                </a:solidFill>
+                <a:latin typeface="Avenir Next Medium" panose="020B0503020202020204" pitchFamily="34" charset="0"/>
+              </a:rPr>
+              <a:t>Brian </a:t>
+            </a:r>
+            <a:r>
+              <a:rPr lang="en-US" sz="2400" dirty="0" err="1">
+                <a:solidFill>
+                  <a:schemeClr val="bg1"/>
+                </a:solidFill>
+                <a:latin typeface="Avenir Next Medium" panose="020B0503020202020204" pitchFamily="34" charset="0"/>
+              </a:rPr>
+              <a:t>Zelip</a:t>
+            </a:r>
+            <a:endParaRPr lang="en-US" sz="2400" dirty="0">
+              <a:solidFill>
+                <a:schemeClr val="bg1"/>
+              </a:solidFill>
+              <a:latin typeface="Avenir Next Medium" panose="020B0503020202020204" pitchFamily="34" charset="0"/>
+            </a:endParaRPr>
+          </a:p>
+        </p:txBody>
+      </p:sp>
+      <p:sp>
+        <p:nvSpPr>
+          <p:cNvPr id="4" name="TextBox 3">
+            <a:extLst>
+              <a:ext uri="{FF2B5EF4-FFF2-40B4-BE49-F238E27FC236}">
+                <a16:creationId xmlns:a16="http://schemas.microsoft.com/office/drawing/2014/main" id="{2DA5F819-53F8-114C-AD1D-0783565C82A1}"/>
+              </a:ext>
+            </a:extLst>
+          </p:cNvPr>
+          <p:cNvSpPr txBox="1"/>
+          <p:nvPr/>
+        </p:nvSpPr>
+        <p:spPr>
+          <a:xfrm>
+            <a:off x="10780873" y="146884"/>
+            <a:ext cx="1325043" cy="369332"/>
+          </a:xfrm>
+          <a:prstGeom prst="rect">
+            <a:avLst/>
+          </a:prstGeom>
+          <a:noFill/>
+        </p:spPr>
+        <p:txBody>
+          <a:bodyPr wrap="none" rtlCol="0">
+            <a:spAutoFit/>
+          </a:bodyPr>
+          <a:lstStyle/>
+          <a:p>
+            <a:r>
+              <a:rPr lang="en-US" dirty="0">
+                <a:solidFill>
+                  <a:schemeClr val="bg1"/>
+                </a:solidFill>
+                <a:latin typeface="Avenir Next Medium" panose="020B0503020202020204" pitchFamily="34" charset="0"/>
+              </a:rPr>
+              <a:t>MAC 2021</a:t>
+            </a:r>
           </a:p>
         </p:txBody>
       </p:sp>
     </p:spTree>
     <p:extLst>
       <p:ext uri="{BB962C8B-B14F-4D97-AF65-F5344CB8AC3E}">
-        <p14:creationId xmlns:p14="http://schemas.microsoft.com/office/powerpoint/2010/main" val="3293613108"/>
+        <p14:creationId xmlns:p14="http://schemas.microsoft.com/office/powerpoint/2010/main" val="2602596107"/>
       </p:ext>
     </p:extLst>
   </p:cSld>
@@ -3116,10 +3221,50 @@
           <a:chExt cx="0" cy="0"/>
         </a:xfrm>
       </p:grpSpPr>
+      <p:sp>
+        <p:nvSpPr>
+          <p:cNvPr id="2" name="TextBox 1">
+            <a:extLst>
+              <a:ext uri="{FF2B5EF4-FFF2-40B4-BE49-F238E27FC236}">
+                <a16:creationId xmlns:a16="http://schemas.microsoft.com/office/drawing/2014/main" id="{2788E1C9-79BA-7440-B006-72C422F8014E}"/>
+              </a:ext>
+            </a:extLst>
+          </p:cNvPr>
+          <p:cNvSpPr txBox="1"/>
+          <p:nvPr/>
+        </p:nvSpPr>
+        <p:spPr>
+          <a:xfrm>
+            <a:off x="1374867" y="1584252"/>
+            <a:ext cx="9442265" cy="923330"/>
+          </a:xfrm>
+          <a:prstGeom prst="rect">
+            <a:avLst/>
+          </a:prstGeom>
+          <a:noFill/>
+        </p:spPr>
+        <p:txBody>
+          <a:bodyPr wrap="none" rtlCol="0">
+            <a:spAutoFit/>
+          </a:bodyPr>
+          <a:lstStyle/>
+          <a:p>
+            <a:r>
+              <a:rPr lang="en-US" sz="5400" b="1" dirty="0">
+                <a:solidFill>
+                  <a:schemeClr val="bg1"/>
+                </a:solidFill>
+                <a:latin typeface="Avenir Next Demi Bold" panose="020B0503020202020204" pitchFamily="34" charset="0"/>
+              </a:rPr>
+              <a:t>THE DEETS in Tabular format</a:t>
+            </a:r>
+          </a:p>
+        </p:txBody>
+      </p:sp>
     </p:spTree>
     <p:extLst>
       <p:ext uri="{BB962C8B-B14F-4D97-AF65-F5344CB8AC3E}">
-        <p14:creationId xmlns:p14="http://schemas.microsoft.com/office/powerpoint/2010/main" val="2602596107"/>
+        <p14:creationId xmlns:p14="http://schemas.microsoft.com/office/powerpoint/2010/main" val="1093137720"/>
       </p:ext>
     </p:extLst>
   </p:cSld>
@@ -3160,10 +3305,50 @@
           <a:chExt cx="0" cy="0"/>
         </a:xfrm>
       </p:grpSpPr>
+      <p:sp>
+        <p:nvSpPr>
+          <p:cNvPr id="2" name="TextBox 1">
+            <a:extLst>
+              <a:ext uri="{FF2B5EF4-FFF2-40B4-BE49-F238E27FC236}">
+                <a16:creationId xmlns:a16="http://schemas.microsoft.com/office/drawing/2014/main" id="{2788E1C9-79BA-7440-B006-72C422F8014E}"/>
+              </a:ext>
+            </a:extLst>
+          </p:cNvPr>
+          <p:cNvSpPr txBox="1"/>
+          <p:nvPr/>
+        </p:nvSpPr>
+        <p:spPr>
+          <a:xfrm>
+            <a:off x="2071308" y="1424762"/>
+            <a:ext cx="8049383" cy="923330"/>
+          </a:xfrm>
+          <a:prstGeom prst="rect">
+            <a:avLst/>
+          </a:prstGeom>
+          <a:noFill/>
+        </p:spPr>
+        <p:txBody>
+          <a:bodyPr wrap="none" rtlCol="0">
+            <a:spAutoFit/>
+          </a:bodyPr>
+          <a:lstStyle/>
+          <a:p>
+            <a:r>
+              <a:rPr lang="en-US" sz="5400" b="1" dirty="0">
+                <a:solidFill>
+                  <a:schemeClr val="bg1"/>
+                </a:solidFill>
+                <a:latin typeface="Avenir Next Demi Bold" panose="020B0503020202020204" pitchFamily="34" charset="0"/>
+              </a:rPr>
+              <a:t>DEETS about the future?</a:t>
+            </a:r>
+          </a:p>
+        </p:txBody>
+      </p:sp>
     </p:spTree>
     <p:extLst>
       <p:ext uri="{BB962C8B-B14F-4D97-AF65-F5344CB8AC3E}">
-        <p14:creationId xmlns:p14="http://schemas.microsoft.com/office/powerpoint/2010/main" val="1093137720"/>
+        <p14:creationId xmlns:p14="http://schemas.microsoft.com/office/powerpoint/2010/main" val="1125116056"/>
       </p:ext>
     </p:extLst>
   </p:cSld>

</xml_diff>

<commit_message>
Add slide01.md and add update pptx with slide 1 and 2 info
</commit_message>
<xml_diff>
--- a/slides.pptx
+++ b/slides.pptx
@@ -8,6 +8,7 @@
     <p:sldId id="257" r:id="rId2"/>
     <p:sldId id="258" r:id="rId3"/>
     <p:sldId id="259" r:id="rId4"/>
+    <p:sldId id="260" r:id="rId5"/>
   </p:sldIdLst>
   <p:sldSz cx="12192000" cy="6858000"/>
   <p:notesSz cx="6858000" cy="9144000"/>
@@ -3235,8 +3236,8 @@
         </p:nvSpPr>
         <p:spPr>
           <a:xfrm>
-            <a:off x="1374867" y="1584252"/>
-            <a:ext cx="9442265" cy="923330"/>
+            <a:off x="1438662" y="191387"/>
+            <a:ext cx="8841908" cy="923330"/>
           </a:xfrm>
           <a:prstGeom prst="rect">
             <a:avLst/>
@@ -3256,8 +3257,176 @@
                 </a:solidFill>
                 <a:latin typeface="Avenir Next Demi Bold" panose="020B0503020202020204" pitchFamily="34" charset="0"/>
               </a:rPr>
-              <a:t>THE DEETS in Tabular format</a:t>
-            </a:r>
+              <a:t>What is Library Carpentry? </a:t>
+            </a:r>
+          </a:p>
+        </p:txBody>
+      </p:sp>
+      <p:sp>
+        <p:nvSpPr>
+          <p:cNvPr id="3" name="TextBox 2">
+            <a:extLst>
+              <a:ext uri="{FF2B5EF4-FFF2-40B4-BE49-F238E27FC236}">
+                <a16:creationId xmlns:a16="http://schemas.microsoft.com/office/drawing/2014/main" id="{4285BDF8-BAE3-7F42-AA9D-BADF61892044}"/>
+              </a:ext>
+            </a:extLst>
+          </p:cNvPr>
+          <p:cNvSpPr txBox="1"/>
+          <p:nvPr/>
+        </p:nvSpPr>
+        <p:spPr>
+          <a:xfrm>
+            <a:off x="689344" y="1423681"/>
+            <a:ext cx="10813312" cy="3170099"/>
+          </a:xfrm>
+          <a:prstGeom prst="rect">
+            <a:avLst/>
+          </a:prstGeom>
+          <a:noFill/>
+        </p:spPr>
+        <p:txBody>
+          <a:bodyPr wrap="square" rtlCol="0">
+            <a:spAutoFit/>
+          </a:bodyPr>
+          <a:lstStyle/>
+          <a:p>
+            <a:r>
+              <a:rPr lang="en-US" sz="2000" dirty="0">
+                <a:solidFill>
+                  <a:schemeClr val="bg1"/>
+                </a:solidFill>
+                <a:latin typeface="Avenir Next" panose="020B0503020202020204" pitchFamily="34" charset="0"/>
+              </a:rPr>
+              <a:t>The Carpentries is a non-profit dedicated to teaching coding and data science skills to researchers worldwide through inclusive, hands-on workshops.</a:t>
+            </a:r>
+          </a:p>
+          <a:p>
+            <a:endParaRPr lang="en-US" sz="2000" dirty="0">
+              <a:solidFill>
+                <a:schemeClr val="bg1"/>
+              </a:solidFill>
+              <a:latin typeface="Avenir Next" panose="020B0503020202020204" pitchFamily="34" charset="0"/>
+            </a:endParaRPr>
+          </a:p>
+          <a:p>
+            <a:r>
+              <a:rPr lang="en-US" sz="2000" dirty="0">
+                <a:solidFill>
+                  <a:schemeClr val="bg1"/>
+                </a:solidFill>
+                <a:latin typeface="Avenir Next" panose="020B0503020202020204" pitchFamily="34" charset="0"/>
+              </a:rPr>
+              <a:t>Library Carpentry (LC) is a subset of the Carpentries curriculum directed at library staff.</a:t>
+            </a:r>
+          </a:p>
+          <a:p>
+            <a:endParaRPr lang="en-US" sz="2000" dirty="0">
+              <a:solidFill>
+                <a:schemeClr val="bg1"/>
+              </a:solidFill>
+              <a:latin typeface="Avenir Next" panose="020B0503020202020204" pitchFamily="34" charset="0"/>
+            </a:endParaRPr>
+          </a:p>
+          <a:p>
+            <a:r>
+              <a:rPr lang="en-US" sz="2000" dirty="0">
+                <a:solidFill>
+                  <a:schemeClr val="bg1"/>
+                </a:solidFill>
+                <a:latin typeface="Avenir Next" panose="020B0503020202020204" pitchFamily="34" charset="0"/>
+              </a:rPr>
+              <a:t>A common LC workshop is held over two days and is comprised of four lessons:</a:t>
+            </a:r>
+          </a:p>
+          <a:p>
+            <a:pPr marL="285750" indent="-285750">
+              <a:buFont typeface="Arial" panose="020B0604020202020204" pitchFamily="34" charset="0"/>
+              <a:buChar char="•"/>
+            </a:pPr>
+            <a:r>
+              <a:rPr lang="en-US" sz="2000" dirty="0">
+                <a:solidFill>
+                  <a:schemeClr val="bg1"/>
+                </a:solidFill>
+                <a:latin typeface="Avenir Next" panose="020B0503020202020204" pitchFamily="34" charset="0"/>
+              </a:rPr>
+              <a:t>Introduction to working with data and Regular Expressions</a:t>
+            </a:r>
+          </a:p>
+          <a:p>
+            <a:pPr marL="285750" indent="-285750">
+              <a:buFont typeface="Arial" panose="020B0604020202020204" pitchFamily="34" charset="0"/>
+              <a:buChar char="•"/>
+            </a:pPr>
+            <a:r>
+              <a:rPr lang="en-US" sz="2000" dirty="0">
+                <a:solidFill>
+                  <a:schemeClr val="bg1"/>
+                </a:solidFill>
+                <a:latin typeface="Avenir Next" panose="020B0503020202020204" pitchFamily="34" charset="0"/>
+              </a:rPr>
+              <a:t>The UNIX Shell</a:t>
+            </a:r>
+          </a:p>
+          <a:p>
+            <a:pPr marL="285750" indent="-285750">
+              <a:buFont typeface="Arial" panose="020B0604020202020204" pitchFamily="34" charset="0"/>
+              <a:buChar char="•"/>
+            </a:pPr>
+            <a:r>
+              <a:rPr lang="en-US" sz="2000" dirty="0">
+                <a:solidFill>
+                  <a:schemeClr val="bg1"/>
+                </a:solidFill>
+                <a:latin typeface="Avenir Next" panose="020B0503020202020204" pitchFamily="34" charset="0"/>
+              </a:rPr>
+              <a:t>Introduction to </a:t>
+            </a:r>
+            <a:r>
+              <a:rPr lang="en-US" sz="2000" dirty="0" err="1">
+                <a:solidFill>
+                  <a:schemeClr val="bg1"/>
+                </a:solidFill>
+                <a:latin typeface="Avenir Next" panose="020B0503020202020204" pitchFamily="34" charset="0"/>
+              </a:rPr>
+              <a:t>Github</a:t>
+            </a:r>
+            <a:endParaRPr lang="en-US" sz="2000" dirty="0">
+              <a:solidFill>
+                <a:schemeClr val="bg1"/>
+              </a:solidFill>
+              <a:latin typeface="Avenir Next" panose="020B0503020202020204" pitchFamily="34" charset="0"/>
+            </a:endParaRPr>
+          </a:p>
+          <a:p>
+            <a:pPr marL="285750" indent="-285750">
+              <a:buFont typeface="Arial" panose="020B0604020202020204" pitchFamily="34" charset="0"/>
+              <a:buChar char="•"/>
+            </a:pPr>
+            <a:r>
+              <a:rPr lang="en-US" sz="2000" dirty="0">
+                <a:solidFill>
+                  <a:schemeClr val="bg1"/>
+                </a:solidFill>
+                <a:latin typeface="Avenir Next" panose="020B0503020202020204" pitchFamily="34" charset="0"/>
+              </a:rPr>
+              <a:t>Introduction to </a:t>
+            </a:r>
+            <a:r>
+              <a:rPr lang="en-US" sz="2000" dirty="0" err="1">
+                <a:solidFill>
+                  <a:schemeClr val="bg1"/>
+                </a:solidFill>
+                <a:latin typeface="Avenir Next" panose="020B0503020202020204" pitchFamily="34" charset="0"/>
+              </a:rPr>
+              <a:t>OpenRefine</a:t>
+            </a:r>
+            <a:endParaRPr lang="en-US" sz="2000" dirty="0">
+              <a:solidFill>
+                <a:schemeClr val="bg1"/>
+              </a:solidFill>
+              <a:latin typeface="Avenir Next" panose="020B0503020202020204" pitchFamily="34" charset="0"/>
+            </a:endParaRPr>
           </a:p>
         </p:txBody>
       </p:sp>
@@ -3319,8 +3488,8 @@
         </p:nvSpPr>
         <p:spPr>
           <a:xfrm>
-            <a:off x="2071308" y="1424762"/>
-            <a:ext cx="8049383" cy="923330"/>
+            <a:off x="2060676" y="584790"/>
+            <a:ext cx="7722050" cy="923330"/>
           </a:xfrm>
           <a:prstGeom prst="rect">
             <a:avLst/>
@@ -3340,7 +3509,237 @@
                 </a:solidFill>
                 <a:latin typeface="Avenir Next Demi Bold" panose="020B0503020202020204" pitchFamily="34" charset="0"/>
               </a:rPr>
-              <a:t>DEETS about the future?</a:t>
+              <a:t>Our experience with LC</a:t>
+            </a:r>
+          </a:p>
+        </p:txBody>
+      </p:sp>
+      <p:sp>
+        <p:nvSpPr>
+          <p:cNvPr id="3" name="TextBox 2">
+            <a:extLst>
+              <a:ext uri="{FF2B5EF4-FFF2-40B4-BE49-F238E27FC236}">
+                <a16:creationId xmlns:a16="http://schemas.microsoft.com/office/drawing/2014/main" id="{9B84586B-2FCD-D349-B5FB-8D1B5582CC90}"/>
+              </a:ext>
+            </a:extLst>
+          </p:cNvPr>
+          <p:cNvSpPr txBox="1"/>
+          <p:nvPr/>
+        </p:nvSpPr>
+        <p:spPr>
+          <a:xfrm>
+            <a:off x="689344" y="1423681"/>
+            <a:ext cx="10813312" cy="3170099"/>
+          </a:xfrm>
+          <a:prstGeom prst="rect">
+            <a:avLst/>
+          </a:prstGeom>
+          <a:noFill/>
+        </p:spPr>
+        <p:txBody>
+          <a:bodyPr wrap="square" rtlCol="0">
+            <a:spAutoFit/>
+          </a:bodyPr>
+          <a:lstStyle/>
+          <a:p>
+            <a:pPr marL="342900" indent="-342900">
+              <a:buFont typeface="Arial" panose="020B0604020202020204" pitchFamily="34" charset="0"/>
+              <a:buChar char="•"/>
+            </a:pPr>
+            <a:r>
+              <a:rPr lang="en-US" sz="2000" dirty="0">
+                <a:solidFill>
+                  <a:schemeClr val="bg1"/>
+                </a:solidFill>
+                <a:latin typeface="Avenir Next" panose="020B0503020202020204" pitchFamily="34" charset="0"/>
+              </a:rPr>
+              <a:t>Logistics</a:t>
+            </a:r>
+          </a:p>
+          <a:p>
+            <a:pPr marL="800100" lvl="1" indent="-342900">
+              <a:buFont typeface="Arial" panose="020B0604020202020204" pitchFamily="34" charset="0"/>
+              <a:buChar char="•"/>
+            </a:pPr>
+            <a:r>
+              <a:rPr lang="en-US" sz="2000" dirty="0">
+                <a:solidFill>
+                  <a:schemeClr val="bg1"/>
+                </a:solidFill>
+                <a:latin typeface="Avenir Next" panose="020B0503020202020204" pitchFamily="34" charset="0"/>
+              </a:rPr>
+              <a:t>Change from in person to virtual (use of Zoom and </a:t>
+            </a:r>
+            <a:r>
+              <a:rPr lang="en-US" sz="2000" dirty="0" err="1">
+                <a:solidFill>
+                  <a:schemeClr val="bg1"/>
+                </a:solidFill>
+                <a:latin typeface="Avenir Next" panose="020B0503020202020204" pitchFamily="34" charset="0"/>
+              </a:rPr>
+              <a:t>Etherpad</a:t>
+            </a:r>
+            <a:r>
+              <a:rPr lang="en-US" sz="2000" dirty="0">
+                <a:solidFill>
+                  <a:schemeClr val="bg1"/>
+                </a:solidFill>
+                <a:latin typeface="Avenir Next" panose="020B0503020202020204" pitchFamily="34" charset="0"/>
+              </a:rPr>
+              <a:t>)</a:t>
+            </a:r>
+          </a:p>
+          <a:p>
+            <a:pPr marL="800100" lvl="1" indent="-342900">
+              <a:buFont typeface="Arial" panose="020B0604020202020204" pitchFamily="34" charset="0"/>
+              <a:buChar char="•"/>
+            </a:pPr>
+            <a:r>
+              <a:rPr lang="en-US" sz="2000" dirty="0">
+                <a:solidFill>
+                  <a:schemeClr val="bg1"/>
+                </a:solidFill>
+                <a:latin typeface="Avenir Next" panose="020B0503020202020204" pitchFamily="34" charset="0"/>
+              </a:rPr>
+              <a:t>Central org helped with instructor recruitment</a:t>
+            </a:r>
+          </a:p>
+          <a:p>
+            <a:pPr marL="800100" lvl="1" indent="-342900">
+              <a:buFont typeface="Arial" panose="020B0604020202020204" pitchFamily="34" charset="0"/>
+              <a:buChar char="•"/>
+            </a:pPr>
+            <a:r>
+              <a:rPr lang="en-US" sz="2000" dirty="0">
+                <a:solidFill>
+                  <a:schemeClr val="bg1"/>
+                </a:solidFill>
+                <a:latin typeface="Avenir Next" panose="020B0503020202020204" pitchFamily="34" charset="0"/>
+              </a:rPr>
+              <a:t>Advertising through NNLM channels</a:t>
+            </a:r>
+          </a:p>
+          <a:p>
+            <a:pPr marL="342900" indent="-342900">
+              <a:buFont typeface="Arial" panose="020B0604020202020204" pitchFamily="34" charset="0"/>
+              <a:buChar char="•"/>
+            </a:pPr>
+            <a:r>
+              <a:rPr lang="en-US" sz="2000" dirty="0">
+                <a:solidFill>
+                  <a:schemeClr val="bg1"/>
+                </a:solidFill>
+                <a:latin typeface="Avenir Next" panose="020B0503020202020204" pitchFamily="34" charset="0"/>
+              </a:rPr>
+              <a:t>Changes in second LC event</a:t>
+            </a:r>
+          </a:p>
+          <a:p>
+            <a:pPr marL="800100" lvl="1" indent="-342900">
+              <a:buFont typeface="Arial" panose="020B0604020202020204" pitchFamily="34" charset="0"/>
+              <a:buChar char="•"/>
+            </a:pPr>
+            <a:r>
+              <a:rPr lang="en-US" sz="2000" dirty="0">
+                <a:solidFill>
+                  <a:schemeClr val="bg1"/>
+                </a:solidFill>
+                <a:latin typeface="Avenir Next" panose="020B0503020202020204" pitchFamily="34" charset="0"/>
+              </a:rPr>
+              <a:t>Shorter duration</a:t>
+            </a:r>
+          </a:p>
+          <a:p>
+            <a:pPr marL="800100" lvl="1" indent="-342900">
+              <a:buFont typeface="Arial" panose="020B0604020202020204" pitchFamily="34" charset="0"/>
+              <a:buChar char="•"/>
+            </a:pPr>
+            <a:r>
+              <a:rPr lang="en-US" sz="2000" dirty="0">
+                <a:solidFill>
+                  <a:schemeClr val="bg1"/>
+                </a:solidFill>
+                <a:latin typeface="Avenir Next" panose="020B0503020202020204" pitchFamily="34" charset="0"/>
+              </a:rPr>
+              <a:t>Tidy Data and R instead of Git and </a:t>
+            </a:r>
+            <a:r>
+              <a:rPr lang="en-US" sz="2000" dirty="0" err="1">
+                <a:solidFill>
+                  <a:schemeClr val="bg1"/>
+                </a:solidFill>
+                <a:latin typeface="Avenir Next" panose="020B0503020202020204" pitchFamily="34" charset="0"/>
+              </a:rPr>
+              <a:t>OpenRefine</a:t>
+            </a:r>
+            <a:endParaRPr lang="en-US" sz="2000" dirty="0">
+              <a:solidFill>
+                <a:schemeClr val="bg1"/>
+              </a:solidFill>
+              <a:latin typeface="Avenir Next" panose="020B0503020202020204" pitchFamily="34" charset="0"/>
+            </a:endParaRPr>
+          </a:p>
+          <a:p>
+            <a:pPr marL="342900" indent="-342900">
+              <a:buFont typeface="Arial" panose="020B0604020202020204" pitchFamily="34" charset="0"/>
+              <a:buChar char="•"/>
+            </a:pPr>
+            <a:r>
+              <a:rPr lang="en-US" sz="2000" dirty="0">
+                <a:solidFill>
+                  <a:schemeClr val="bg1"/>
+                </a:solidFill>
+                <a:latin typeface="Avenir Next" panose="020B0503020202020204" pitchFamily="34" charset="0"/>
+              </a:rPr>
+              <a:t>Challenges</a:t>
+            </a:r>
+          </a:p>
+          <a:p>
+            <a:pPr marL="800100" lvl="1" indent="-342900">
+              <a:buFont typeface="Arial" panose="020B0604020202020204" pitchFamily="34" charset="0"/>
+              <a:buChar char="•"/>
+            </a:pPr>
+            <a:r>
+              <a:rPr lang="en-US" sz="2000" dirty="0">
+                <a:solidFill>
+                  <a:schemeClr val="bg1"/>
+                </a:solidFill>
+                <a:latin typeface="Avenir Next" panose="020B0503020202020204" pitchFamily="34" charset="0"/>
+              </a:rPr>
+              <a:t>Keeping everyone together in </a:t>
+            </a:r>
+            <a:r>
+              <a:rPr lang="en-US" sz="2000">
+                <a:solidFill>
+                  <a:schemeClr val="bg1"/>
+                </a:solidFill>
+                <a:latin typeface="Avenir Next" panose="020B0503020202020204" pitchFamily="34" charset="0"/>
+              </a:rPr>
+              <a:t>virtual environment</a:t>
+            </a:r>
+          </a:p>
+          <a:p>
+            <a:pPr marL="800100" lvl="1" indent="-342900">
+              <a:buFont typeface="Arial" panose="020B0604020202020204" pitchFamily="34" charset="0"/>
+              <a:buChar char="•"/>
+            </a:pPr>
+            <a:r>
+              <a:rPr lang="en-US" sz="2000">
+                <a:solidFill>
+                  <a:schemeClr val="bg1"/>
+                </a:solidFill>
+                <a:latin typeface="Avenir Next" panose="020B0503020202020204" pitchFamily="34" charset="0"/>
+              </a:rPr>
+              <a:t>Harmonizing </a:t>
+            </a:r>
+            <a:r>
+              <a:rPr lang="en-US" sz="2000" dirty="0">
+                <a:solidFill>
+                  <a:schemeClr val="bg1"/>
+                </a:solidFill>
+                <a:latin typeface="Avenir Next" panose="020B0503020202020204" pitchFamily="34" charset="0"/>
+              </a:rPr>
+              <a:t>experience with multiple instructors</a:t>
             </a:r>
           </a:p>
         </p:txBody>
@@ -3349,6 +3748,90 @@
     <p:extLst>
       <p:ext uri="{BB962C8B-B14F-4D97-AF65-F5344CB8AC3E}">
         <p14:creationId xmlns:p14="http://schemas.microsoft.com/office/powerpoint/2010/main" val="1125116056"/>
+      </p:ext>
+    </p:extLst>
+  </p:cSld>
+  <p:clrMapOvr>
+    <a:masterClrMapping/>
+  </p:clrMapOvr>
+</p:sld>
+</file>
+
+<file path=ppt/slides/slide4.xml><?xml version="1.0" encoding="utf-8"?>
+<p:sld xmlns:a="http://schemas.openxmlformats.org/drawingml/2006/main" xmlns:r="http://schemas.openxmlformats.org/officeDocument/2006/relationships" xmlns:p="http://schemas.openxmlformats.org/presentationml/2006/main">
+  <p:cSld>
+    <p:bg>
+      <p:bgPr>
+        <a:blipFill dpi="0" rotWithShape="1">
+          <a:blip r:embed="rId2">
+            <a:lum/>
+          </a:blip>
+          <a:srcRect/>
+          <a:stretch>
+            <a:fillRect/>
+          </a:stretch>
+        </a:blipFill>
+        <a:effectLst/>
+      </p:bgPr>
+    </p:bg>
+    <p:spTree>
+      <p:nvGrpSpPr>
+        <p:cNvPr id="1" name=""/>
+        <p:cNvGrpSpPr/>
+        <p:nvPr/>
+      </p:nvGrpSpPr>
+      <p:grpSpPr>
+        <a:xfrm>
+          <a:off x="0" y="0"/>
+          <a:ext cx="0" cy="0"/>
+          <a:chOff x="0" y="0"/>
+          <a:chExt cx="0" cy="0"/>
+        </a:xfrm>
+      </p:grpSpPr>
+      <p:sp>
+        <p:nvSpPr>
+          <p:cNvPr id="2" name="TextBox 1">
+            <a:extLst>
+              <a:ext uri="{FF2B5EF4-FFF2-40B4-BE49-F238E27FC236}">
+                <a16:creationId xmlns:a16="http://schemas.microsoft.com/office/drawing/2014/main" id="{2788E1C9-79BA-7440-B006-72C422F8014E}"/>
+              </a:ext>
+            </a:extLst>
+          </p:cNvPr>
+          <p:cNvSpPr txBox="1"/>
+          <p:nvPr/>
+        </p:nvSpPr>
+        <p:spPr>
+          <a:xfrm>
+            <a:off x="2060676" y="988827"/>
+            <a:ext cx="8658204" cy="923330"/>
+          </a:xfrm>
+          <a:prstGeom prst="rect">
+            <a:avLst/>
+          </a:prstGeom>
+          <a:noFill/>
+        </p:spPr>
+        <p:txBody>
+          <a:bodyPr wrap="none" rtlCol="0">
+            <a:spAutoFit/>
+          </a:bodyPr>
+          <a:lstStyle/>
+          <a:p>
+            <a:r>
+              <a:rPr lang="en-US" sz="5400" b="1" dirty="0">
+                <a:solidFill>
+                  <a:schemeClr val="bg1"/>
+                </a:solidFill>
+                <a:latin typeface="Avenir Next Demi Bold" panose="020B0503020202020204" pitchFamily="34" charset="0"/>
+              </a:rPr>
+              <a:t>Self-hosting LC workshops</a:t>
+            </a:r>
+          </a:p>
+        </p:txBody>
+      </p:sp>
+    </p:spTree>
+    <p:extLst>
+      <p:ext uri="{BB962C8B-B14F-4D97-AF65-F5344CB8AC3E}">
+        <p14:creationId xmlns:p14="http://schemas.microsoft.com/office/powerpoint/2010/main" val="2241170693"/>
       </p:ext>
     </p:extLst>
   </p:cSld>

</xml_diff>

<commit_message>
Add logos and acknowledgement slide
</commit_message>
<xml_diff>
--- a/slides.pptx
+++ b/slides.pptx
@@ -9,6 +9,7 @@
     <p:sldId id="258" r:id="rId3"/>
     <p:sldId id="259" r:id="rId4"/>
     <p:sldId id="260" r:id="rId5"/>
+    <p:sldId id="261" r:id="rId6"/>
   </p:sldIdLst>
   <p:sldSz cx="12192000" cy="6858000"/>
   <p:notesSz cx="6858000" cy="9144000"/>
@@ -3841,6 +3842,228 @@
 </p:sld>
 </file>
 
+<file path=ppt/slides/slide5.xml><?xml version="1.0" encoding="utf-8"?>
+<p:sld xmlns:a="http://schemas.openxmlformats.org/drawingml/2006/main" xmlns:r="http://schemas.openxmlformats.org/officeDocument/2006/relationships" xmlns:p="http://schemas.openxmlformats.org/presentationml/2006/main">
+  <p:cSld>
+    <p:bg>
+      <p:bgPr>
+        <a:blipFill dpi="0" rotWithShape="1">
+          <a:blip r:embed="rId2">
+            <a:lum/>
+          </a:blip>
+          <a:srcRect/>
+          <a:stretch>
+            <a:fillRect/>
+          </a:stretch>
+        </a:blipFill>
+        <a:effectLst/>
+      </p:bgPr>
+    </p:bg>
+    <p:spTree>
+      <p:nvGrpSpPr>
+        <p:cNvPr id="1" name=""/>
+        <p:cNvGrpSpPr/>
+        <p:nvPr/>
+      </p:nvGrpSpPr>
+      <p:grpSpPr>
+        <a:xfrm>
+          <a:off x="0" y="0"/>
+          <a:ext cx="0" cy="0"/>
+          <a:chOff x="0" y="0"/>
+          <a:chExt cx="0" cy="0"/>
+        </a:xfrm>
+      </p:grpSpPr>
+      <p:sp>
+        <p:nvSpPr>
+          <p:cNvPr id="2" name="TextBox 1">
+            <a:extLst>
+              <a:ext uri="{FF2B5EF4-FFF2-40B4-BE49-F238E27FC236}">
+                <a16:creationId xmlns:a16="http://schemas.microsoft.com/office/drawing/2014/main" id="{E97D5640-866E-434D-99D3-CDF94855533F}"/>
+              </a:ext>
+            </a:extLst>
+          </p:cNvPr>
+          <p:cNvSpPr txBox="1"/>
+          <p:nvPr/>
+        </p:nvSpPr>
+        <p:spPr>
+          <a:xfrm>
+            <a:off x="684974" y="1262767"/>
+            <a:ext cx="2860078" cy="1323439"/>
+          </a:xfrm>
+          <a:prstGeom prst="rect">
+            <a:avLst/>
+          </a:prstGeom>
+          <a:noFill/>
+        </p:spPr>
+        <p:txBody>
+          <a:bodyPr wrap="none" rtlCol="0">
+            <a:spAutoFit/>
+          </a:bodyPr>
+          <a:lstStyle/>
+          <a:p>
+            <a:r>
+              <a:rPr lang="en-US" sz="4000" b="1" dirty="0">
+                <a:solidFill>
+                  <a:schemeClr val="bg1"/>
+                </a:solidFill>
+                <a:latin typeface="Avenir Next Demi Bold" panose="020B0503020202020204" pitchFamily="34" charset="0"/>
+              </a:rPr>
+              <a:t>Thank you!</a:t>
+            </a:r>
+          </a:p>
+          <a:p>
+            <a:r>
+              <a:rPr lang="en-US" sz="4000" b="1" dirty="0">
+                <a:solidFill>
+                  <a:schemeClr val="bg1"/>
+                </a:solidFill>
+                <a:latin typeface="Avenir Next Demi Bold" panose="020B0503020202020204" pitchFamily="34" charset="0"/>
+              </a:rPr>
+              <a:t>Questions?</a:t>
+            </a:r>
+          </a:p>
+        </p:txBody>
+      </p:sp>
+      <p:sp>
+        <p:nvSpPr>
+          <p:cNvPr id="3" name="TextBox 2">
+            <a:extLst>
+              <a:ext uri="{FF2B5EF4-FFF2-40B4-BE49-F238E27FC236}">
+                <a16:creationId xmlns:a16="http://schemas.microsoft.com/office/drawing/2014/main" id="{D1347224-7EF2-864B-851A-DE131E19ED82}"/>
+              </a:ext>
+            </a:extLst>
+          </p:cNvPr>
+          <p:cNvSpPr txBox="1"/>
+          <p:nvPr/>
+        </p:nvSpPr>
+        <p:spPr>
+          <a:xfrm>
+            <a:off x="2764715" y="2848294"/>
+            <a:ext cx="7623294" cy="646331"/>
+          </a:xfrm>
+          <a:prstGeom prst="rect">
+            <a:avLst/>
+          </a:prstGeom>
+          <a:noFill/>
+        </p:spPr>
+        <p:txBody>
+          <a:bodyPr wrap="square" rtlCol="0">
+            <a:spAutoFit/>
+          </a:bodyPr>
+          <a:lstStyle/>
+          <a:p>
+            <a:r>
+              <a:rPr lang="en-US" dirty="0">
+                <a:solidFill>
+                  <a:schemeClr val="bg1"/>
+                </a:solidFill>
+                <a:latin typeface="Avenir Next Medium" panose="020B0503020202020204" pitchFamily="34" charset="0"/>
+              </a:rPr>
+              <a:t>Partial funding made possible by the (acknowledgement goes here)</a:t>
+            </a:r>
+          </a:p>
+          <a:p>
+            <a:r>
+              <a:rPr lang="en-US" dirty="0">
+                <a:solidFill>
+                  <a:schemeClr val="bg1"/>
+                </a:solidFill>
+                <a:latin typeface="Avenir Next Medium" panose="020B0503020202020204" pitchFamily="34" charset="0"/>
+              </a:rPr>
+              <a:t>Cooperative agreement # UG4 LM013724</a:t>
+            </a:r>
+          </a:p>
+        </p:txBody>
+      </p:sp>
+      <p:sp>
+        <p:nvSpPr>
+          <p:cNvPr id="4" name="TextBox 3">
+            <a:extLst>
+              <a:ext uri="{FF2B5EF4-FFF2-40B4-BE49-F238E27FC236}">
+                <a16:creationId xmlns:a16="http://schemas.microsoft.com/office/drawing/2014/main" id="{2DA5F819-53F8-114C-AD1D-0783565C82A1}"/>
+              </a:ext>
+            </a:extLst>
+          </p:cNvPr>
+          <p:cNvSpPr txBox="1"/>
+          <p:nvPr/>
+        </p:nvSpPr>
+        <p:spPr>
+          <a:xfrm>
+            <a:off x="10780873" y="146884"/>
+            <a:ext cx="1325043" cy="369332"/>
+          </a:xfrm>
+          <a:prstGeom prst="rect">
+            <a:avLst/>
+          </a:prstGeom>
+          <a:noFill/>
+        </p:spPr>
+        <p:txBody>
+          <a:bodyPr wrap="none" rtlCol="0">
+            <a:spAutoFit/>
+          </a:bodyPr>
+          <a:lstStyle/>
+          <a:p>
+            <a:r>
+              <a:rPr lang="en-US" dirty="0">
+                <a:solidFill>
+                  <a:schemeClr val="bg1"/>
+                </a:solidFill>
+                <a:latin typeface="Avenir Next Medium" panose="020B0503020202020204" pitchFamily="34" charset="0"/>
+              </a:rPr>
+              <a:t>MAC 2021</a:t>
+            </a:r>
+          </a:p>
+        </p:txBody>
+      </p:sp>
+      <p:pic>
+        <p:nvPicPr>
+          <p:cNvPr id="8" name="Picture 7" descr="Text&#10;&#10;Description automatically generated">
+            <a:extLst>
+              <a:ext uri="{FF2B5EF4-FFF2-40B4-BE49-F238E27FC236}">
+                <a16:creationId xmlns:a16="http://schemas.microsoft.com/office/drawing/2014/main" id="{C3D42E1D-8509-A045-BDA1-1C6B42220E7E}"/>
+              </a:ext>
+            </a:extLst>
+          </p:cNvPr>
+          <p:cNvPicPr>
+            <a:picLocks noChangeAspect="1"/>
+          </p:cNvPicPr>
+          <p:nvPr/>
+        </p:nvPicPr>
+        <p:blipFill>
+          <a:blip r:embed="rId3">
+            <a:extLst>
+              <a:ext uri="{28A0092B-C50C-407E-A947-70E740481C1C}">
+                <a14:useLocalDpi xmlns:a14="http://schemas.microsoft.com/office/drawing/2010/main" val="0"/>
+              </a:ext>
+            </a:extLst>
+          </a:blip>
+          <a:stretch>
+            <a:fillRect/>
+          </a:stretch>
+        </p:blipFill>
+        <p:spPr>
+          <a:xfrm>
+            <a:off x="4194544" y="3762117"/>
+            <a:ext cx="3802912" cy="610149"/>
+          </a:xfrm>
+          <a:prstGeom prst="rect">
+            <a:avLst/>
+          </a:prstGeom>
+        </p:spPr>
+      </p:pic>
+    </p:spTree>
+    <p:extLst>
+      <p:ext uri="{BB962C8B-B14F-4D97-AF65-F5344CB8AC3E}">
+        <p14:creationId xmlns:p14="http://schemas.microsoft.com/office/powerpoint/2010/main" val="434665400"/>
+      </p:ext>
+    </p:extLst>
+  </p:cSld>
+  <p:clrMapOvr>
+    <a:masterClrMapping/>
+  </p:clrMapOvr>
+</p:sld>
+</file>
+
 <file path=ppt/theme/theme1.xml><?xml version="1.0" encoding="utf-8"?>
 <a:theme xmlns:a="http://schemas.openxmlformats.org/drawingml/2006/main" name="Office Theme">
   <a:themeElements>

</xml_diff>

<commit_message>
Update slides text, layout and theme
</commit_message>
<xml_diff>
--- a/slides.pptx
+++ b/slides.pptx
@@ -245,7 +245,7 @@
           <a:p>
             <a:fld id="{472417AA-5186-4DA5-8FC7-94E6CE6234FF}" type="datetimeFigureOut">
               <a:rPr lang="en-US" smtClean="0"/>
-              <a:t>10/13/21</a:t>
+              <a:t>10/15/2021</a:t>
             </a:fld>
             <a:endParaRPr lang="en-US"/>
           </a:p>
@@ -413,7 +413,7 @@
           <a:p>
             <a:fld id="{472417AA-5186-4DA5-8FC7-94E6CE6234FF}" type="datetimeFigureOut">
               <a:rPr lang="en-US" smtClean="0"/>
-              <a:t>10/13/21</a:t>
+              <a:t>10/15/2021</a:t>
             </a:fld>
             <a:endParaRPr lang="en-US"/>
           </a:p>
@@ -591,7 +591,7 @@
           <a:p>
             <a:fld id="{472417AA-5186-4DA5-8FC7-94E6CE6234FF}" type="datetimeFigureOut">
               <a:rPr lang="en-US" smtClean="0"/>
-              <a:t>10/13/21</a:t>
+              <a:t>10/15/2021</a:t>
             </a:fld>
             <a:endParaRPr lang="en-US"/>
           </a:p>
@@ -759,7 +759,7 @@
           <a:p>
             <a:fld id="{472417AA-5186-4DA5-8FC7-94E6CE6234FF}" type="datetimeFigureOut">
               <a:rPr lang="en-US" smtClean="0"/>
-              <a:t>10/13/21</a:t>
+              <a:t>10/15/2021</a:t>
             </a:fld>
             <a:endParaRPr lang="en-US"/>
           </a:p>
@@ -1004,7 +1004,7 @@
           <a:p>
             <a:fld id="{472417AA-5186-4DA5-8FC7-94E6CE6234FF}" type="datetimeFigureOut">
               <a:rPr lang="en-US" smtClean="0"/>
-              <a:t>10/13/21</a:t>
+              <a:t>10/15/2021</a:t>
             </a:fld>
             <a:endParaRPr lang="en-US"/>
           </a:p>
@@ -1233,7 +1233,7 @@
           <a:p>
             <a:fld id="{472417AA-5186-4DA5-8FC7-94E6CE6234FF}" type="datetimeFigureOut">
               <a:rPr lang="en-US" smtClean="0"/>
-              <a:t>10/13/21</a:t>
+              <a:t>10/15/2021</a:t>
             </a:fld>
             <a:endParaRPr lang="en-US"/>
           </a:p>
@@ -1597,7 +1597,7 @@
           <a:p>
             <a:fld id="{472417AA-5186-4DA5-8FC7-94E6CE6234FF}" type="datetimeFigureOut">
               <a:rPr lang="en-US" smtClean="0"/>
-              <a:t>10/13/21</a:t>
+              <a:t>10/15/2021</a:t>
             </a:fld>
             <a:endParaRPr lang="en-US"/>
           </a:p>
@@ -1714,7 +1714,7 @@
           <a:p>
             <a:fld id="{472417AA-5186-4DA5-8FC7-94E6CE6234FF}" type="datetimeFigureOut">
               <a:rPr lang="en-US" smtClean="0"/>
-              <a:t>10/13/21</a:t>
+              <a:t>10/15/2021</a:t>
             </a:fld>
             <a:endParaRPr lang="en-US"/>
           </a:p>
@@ -1809,7 +1809,7 @@
           <a:p>
             <a:fld id="{472417AA-5186-4DA5-8FC7-94E6CE6234FF}" type="datetimeFigureOut">
               <a:rPr lang="en-US" smtClean="0"/>
-              <a:t>10/13/21</a:t>
+              <a:t>10/15/2021</a:t>
             </a:fld>
             <a:endParaRPr lang="en-US"/>
           </a:p>
@@ -2084,7 +2084,7 @@
           <a:p>
             <a:fld id="{472417AA-5186-4DA5-8FC7-94E6CE6234FF}" type="datetimeFigureOut">
               <a:rPr lang="en-US" smtClean="0"/>
-              <a:t>10/13/21</a:t>
+              <a:t>10/15/2021</a:t>
             </a:fld>
             <a:endParaRPr lang="en-US"/>
           </a:p>
@@ -2336,7 +2336,7 @@
           <a:p>
             <a:fld id="{472417AA-5186-4DA5-8FC7-94E6CE6234FF}" type="datetimeFigureOut">
               <a:rPr lang="en-US" smtClean="0"/>
-              <a:t>10/13/21</a:t>
+              <a:t>10/15/2021</a:t>
             </a:fld>
             <a:endParaRPr lang="en-US"/>
           </a:p>
@@ -2547,7 +2547,7 @@
           <a:p>
             <a:fld id="{472417AA-5186-4DA5-8FC7-94E6CE6234FF}" type="datetimeFigureOut">
               <a:rPr lang="en-US" smtClean="0"/>
-              <a:t>10/13/21</a:t>
+              <a:t>10/15/2021</a:t>
             </a:fld>
             <a:endParaRPr lang="en-US"/>
           </a:p>
@@ -3237,8 +3237,8 @@
         </p:nvSpPr>
         <p:spPr>
           <a:xfrm>
-            <a:off x="1438662" y="191387"/>
-            <a:ext cx="8841908" cy="923330"/>
+            <a:off x="689344" y="170366"/>
+            <a:ext cx="6655155" cy="923330"/>
           </a:xfrm>
           <a:prstGeom prst="rect">
             <a:avLst/>
@@ -3252,14 +3252,20 @@
           <a:lstStyle/>
           <a:p>
             <a:r>
-              <a:rPr lang="en-US" sz="5400" b="1" dirty="0">
+              <a:rPr lang="en-US" sz="5400" b="1" dirty="0" smtClean="0">
                 <a:solidFill>
                   <a:schemeClr val="bg1"/>
                 </a:solidFill>
                 <a:latin typeface="Avenir Next Demi Bold" panose="020B0503020202020204" pitchFamily="34" charset="0"/>
               </a:rPr>
-              <a:t>What is Library Carpentry? </a:t>
-            </a:r>
+              <a:t>Library Carpentry? </a:t>
+            </a:r>
+            <a:endParaRPr lang="en-US" sz="5400" b="1" dirty="0">
+              <a:solidFill>
+                <a:schemeClr val="bg1"/>
+              </a:solidFill>
+              <a:latin typeface="Avenir Next Demi Bold" panose="020B0503020202020204" pitchFamily="34" charset="0"/>
+            </a:endParaRPr>
           </a:p>
         </p:txBody>
       </p:sp>
@@ -3278,7 +3284,7 @@
         <p:spPr>
           <a:xfrm>
             <a:off x="689344" y="1423681"/>
-            <a:ext cx="10813312" cy="3170099"/>
+            <a:ext cx="10813312" cy="1938992"/>
           </a:xfrm>
           <a:prstGeom prst="rect">
             <a:avLst/>
@@ -3317,10 +3323,17 @@
                 </a:solidFill>
                 <a:latin typeface="Avenir Next" panose="020B0503020202020204" pitchFamily="34" charset="0"/>
               </a:rPr>
-              <a:t>Library Carpentry (LC) is a subset of the Carpentries curriculum directed at library staff.</a:t>
-            </a:r>
-          </a:p>
-          <a:p>
+              <a:t>Library Carpentry (LC) is a subset of the Carpentries curriculum </a:t>
+            </a:r>
+            <a:r>
+              <a:rPr lang="en-US" sz="2000" dirty="0" smtClean="0">
+                <a:solidFill>
+                  <a:schemeClr val="bg1"/>
+                </a:solidFill>
+                <a:latin typeface="Avenir Next" panose="020B0503020202020204" pitchFamily="34" charset="0"/>
+              </a:rPr>
+              <a:t>directed library staff.</a:t>
+            </a:r>
             <a:endParaRPr lang="en-US" sz="2000" dirty="0">
               <a:solidFill>
                 <a:schemeClr val="bg1"/>
@@ -3329,69 +3342,6 @@
             </a:endParaRPr>
           </a:p>
           <a:p>
-            <a:r>
-              <a:rPr lang="en-US" sz="2000" dirty="0">
-                <a:solidFill>
-                  <a:schemeClr val="bg1"/>
-                </a:solidFill>
-                <a:latin typeface="Avenir Next" panose="020B0503020202020204" pitchFamily="34" charset="0"/>
-              </a:rPr>
-              <a:t>A common LC workshop is held over two days and is comprised of four lessons:</a:t>
-            </a:r>
-          </a:p>
-          <a:p>
-            <a:pPr marL="285750" indent="-285750">
-              <a:buFont typeface="Arial" panose="020B0604020202020204" pitchFamily="34" charset="0"/>
-              <a:buChar char="•"/>
-            </a:pPr>
-            <a:r>
-              <a:rPr lang="en-US" sz="2000" dirty="0">
-                <a:solidFill>
-                  <a:schemeClr val="bg1"/>
-                </a:solidFill>
-                <a:latin typeface="Avenir Next" panose="020B0503020202020204" pitchFamily="34" charset="0"/>
-              </a:rPr>
-              <a:t>Introduction to working with data and Regular Expressions</a:t>
-            </a:r>
-          </a:p>
-          <a:p>
-            <a:pPr marL="285750" indent="-285750">
-              <a:buFont typeface="Arial" panose="020B0604020202020204" pitchFamily="34" charset="0"/>
-              <a:buChar char="•"/>
-            </a:pPr>
-            <a:r>
-              <a:rPr lang="en-US" sz="2000" dirty="0">
-                <a:solidFill>
-                  <a:schemeClr val="bg1"/>
-                </a:solidFill>
-                <a:latin typeface="Avenir Next" panose="020B0503020202020204" pitchFamily="34" charset="0"/>
-              </a:rPr>
-              <a:t>The UNIX Shell</a:t>
-            </a:r>
-          </a:p>
-          <a:p>
-            <a:pPr marL="285750" indent="-285750">
-              <a:buFont typeface="Arial" panose="020B0604020202020204" pitchFamily="34" charset="0"/>
-              <a:buChar char="•"/>
-            </a:pPr>
-            <a:r>
-              <a:rPr lang="en-US" sz="2000" dirty="0">
-                <a:solidFill>
-                  <a:schemeClr val="bg1"/>
-                </a:solidFill>
-                <a:latin typeface="Avenir Next" panose="020B0503020202020204" pitchFamily="34" charset="0"/>
-              </a:rPr>
-              <a:t>Introduction to </a:t>
-            </a:r>
-            <a:r>
-              <a:rPr lang="en-US" sz="2000" dirty="0" err="1">
-                <a:solidFill>
-                  <a:schemeClr val="bg1"/>
-                </a:solidFill>
-                <a:latin typeface="Avenir Next" panose="020B0503020202020204" pitchFamily="34" charset="0"/>
-              </a:rPr>
-              <a:t>Github</a:t>
-            </a:r>
             <a:endParaRPr lang="en-US" sz="2000" dirty="0">
               <a:solidFill>
                 <a:schemeClr val="bg1"/>
@@ -3400,34 +3350,387 @@
             </a:endParaRPr>
           </a:p>
           <a:p>
-            <a:pPr marL="285750" indent="-285750">
+            <a:r>
+              <a:rPr lang="en-US" sz="2000" dirty="0">
+                <a:solidFill>
+                  <a:schemeClr val="bg1"/>
+                </a:solidFill>
+                <a:latin typeface="Avenir Next" panose="020B0503020202020204" pitchFamily="34" charset="0"/>
+              </a:rPr>
+              <a:t>A common LC </a:t>
+            </a:r>
+            <a:r>
+              <a:rPr lang="en-US" sz="2000" dirty="0" smtClean="0">
+                <a:solidFill>
+                  <a:schemeClr val="bg1"/>
+                </a:solidFill>
+                <a:latin typeface="Avenir Next" panose="020B0503020202020204" pitchFamily="34" charset="0"/>
+              </a:rPr>
+              <a:t>workshop:</a:t>
+            </a:r>
+          </a:p>
+        </p:txBody>
+      </p:sp>
+      <p:sp>
+        <p:nvSpPr>
+          <p:cNvPr id="5" name="TextBox 4"/>
+          <p:cNvSpPr txBox="1"/>
+          <p:nvPr/>
+        </p:nvSpPr>
+        <p:spPr>
+          <a:xfrm>
+            <a:off x="689344" y="3362673"/>
+            <a:ext cx="10016359" cy="2585323"/>
+          </a:xfrm>
+          <a:prstGeom prst="rect">
+            <a:avLst/>
+          </a:prstGeom>
+          <a:noFill/>
+        </p:spPr>
+        <p:txBody>
+          <a:bodyPr wrap="square" numCol="2" rtlCol="0">
+            <a:spAutoFit/>
+          </a:bodyPr>
+          <a:lstStyle/>
+          <a:p>
+            <a:pPr marL="342900" indent="-342900">
               <a:buFont typeface="Arial" panose="020B0604020202020204" pitchFamily="34" charset="0"/>
               <a:buChar char="•"/>
             </a:pPr>
             <a:r>
-              <a:rPr lang="en-US" sz="2000" dirty="0">
+              <a:rPr lang="en-US" dirty="0">
                 <a:solidFill>
                   <a:schemeClr val="bg1"/>
                 </a:solidFill>
                 <a:latin typeface="Avenir Next" panose="020B0503020202020204" pitchFamily="34" charset="0"/>
               </a:rPr>
-              <a:t>Introduction to </a:t>
-            </a:r>
-            <a:r>
-              <a:rPr lang="en-US" sz="2000" dirty="0" err="1">
+              <a:t>2 days long, </a:t>
+            </a:r>
+            <a:r>
+              <a:rPr lang="en-US" dirty="0" smtClean="0">
                 <a:solidFill>
                   <a:schemeClr val="bg1"/>
                 </a:solidFill>
                 <a:latin typeface="Avenir Next" panose="020B0503020202020204" pitchFamily="34" charset="0"/>
               </a:rPr>
-              <a:t>OpenRefine</a:t>
-            </a:r>
-            <a:endParaRPr lang="en-US" sz="2000" dirty="0">
+              <a:t>~7hrs/day</a:t>
+            </a:r>
+            <a:endParaRPr lang="en-US" dirty="0">
               <a:solidFill>
                 <a:schemeClr val="bg1"/>
               </a:solidFill>
               <a:latin typeface="Avenir Next" panose="020B0503020202020204" pitchFamily="34" charset="0"/>
             </a:endParaRPr>
+          </a:p>
+          <a:p>
+            <a:pPr marL="342900" indent="-342900">
+              <a:buFont typeface="Arial" panose="020B0604020202020204" pitchFamily="34" charset="0"/>
+              <a:buChar char="•"/>
+            </a:pPr>
+            <a:r>
+              <a:rPr lang="en-US" dirty="0">
+                <a:solidFill>
+                  <a:schemeClr val="bg1"/>
+                </a:solidFill>
+                <a:latin typeface="Avenir Next" panose="020B0503020202020204" pitchFamily="34" charset="0"/>
+              </a:rPr>
+              <a:t>Plenty of breaks and group discussion</a:t>
+            </a:r>
+          </a:p>
+          <a:p>
+            <a:pPr marL="342900" indent="-342900">
+              <a:buFont typeface="Arial" panose="020B0604020202020204" pitchFamily="34" charset="0"/>
+              <a:buChar char="•"/>
+            </a:pPr>
+            <a:r>
+              <a:rPr lang="en-US" dirty="0" smtClean="0">
+                <a:solidFill>
+                  <a:schemeClr val="bg1"/>
+                </a:solidFill>
+                <a:latin typeface="Avenir Next" panose="020B0503020202020204" pitchFamily="34" charset="0"/>
+              </a:rPr>
+              <a:t>In-person (pre-COVID)</a:t>
+            </a:r>
+          </a:p>
+          <a:p>
+            <a:pPr marL="342900" indent="-342900">
+              <a:buFont typeface="Arial" panose="020B0604020202020204" pitchFamily="34" charset="0"/>
+              <a:buChar char="•"/>
+            </a:pPr>
+            <a:r>
+              <a:rPr lang="en-US" dirty="0" smtClean="0">
+                <a:solidFill>
+                  <a:schemeClr val="bg1"/>
+                </a:solidFill>
+                <a:latin typeface="Avenir Next" panose="020B0503020202020204" pitchFamily="34" charset="0"/>
+              </a:rPr>
+              <a:t>Zoom, </a:t>
+            </a:r>
+            <a:r>
+              <a:rPr lang="en-US" dirty="0" err="1" smtClean="0">
+                <a:solidFill>
+                  <a:schemeClr val="bg1"/>
+                </a:solidFill>
+                <a:latin typeface="Avenir Next" panose="020B0503020202020204" pitchFamily="34" charset="0"/>
+              </a:rPr>
+              <a:t>etc</a:t>
+            </a:r>
+            <a:r>
+              <a:rPr lang="en-US" dirty="0" smtClean="0">
+                <a:solidFill>
+                  <a:schemeClr val="bg1"/>
+                </a:solidFill>
+                <a:latin typeface="Avenir Next" panose="020B0503020202020204" pitchFamily="34" charset="0"/>
+              </a:rPr>
+              <a:t> (now)</a:t>
+            </a:r>
+          </a:p>
+          <a:p>
+            <a:pPr marL="342900" indent="-342900">
+              <a:buFont typeface="Arial" panose="020B0604020202020204" pitchFamily="34" charset="0"/>
+              <a:buChar char="•"/>
+            </a:pPr>
+            <a:endParaRPr lang="en-US" dirty="0">
+              <a:solidFill>
+                <a:schemeClr val="bg1"/>
+              </a:solidFill>
+              <a:latin typeface="Avenir Next" panose="020B0503020202020204" pitchFamily="34" charset="0"/>
+            </a:endParaRPr>
+          </a:p>
+          <a:p>
+            <a:pPr marL="342900" indent="-342900">
+              <a:buFont typeface="Arial" panose="020B0604020202020204" pitchFamily="34" charset="0"/>
+              <a:buChar char="•"/>
+            </a:pPr>
+            <a:endParaRPr lang="en-US" dirty="0" smtClean="0">
+              <a:solidFill>
+                <a:schemeClr val="bg1"/>
+              </a:solidFill>
+              <a:latin typeface="Avenir Next" panose="020B0503020202020204" pitchFamily="34" charset="0"/>
+            </a:endParaRPr>
+          </a:p>
+          <a:p>
+            <a:pPr marL="342900" indent="-342900">
+              <a:buFont typeface="Arial" panose="020B0604020202020204" pitchFamily="34" charset="0"/>
+              <a:buChar char="•"/>
+            </a:pPr>
+            <a:endParaRPr lang="en-US" dirty="0">
+              <a:solidFill>
+                <a:schemeClr val="bg1"/>
+              </a:solidFill>
+              <a:latin typeface="Avenir Next" panose="020B0503020202020204" pitchFamily="34" charset="0"/>
+            </a:endParaRPr>
+          </a:p>
+          <a:p>
+            <a:pPr marL="342900" indent="-342900">
+              <a:buFont typeface="Arial" panose="020B0604020202020204" pitchFamily="34" charset="0"/>
+              <a:buChar char="•"/>
+            </a:pPr>
+            <a:endParaRPr lang="en-US" dirty="0" smtClean="0">
+              <a:solidFill>
+                <a:schemeClr val="bg1"/>
+              </a:solidFill>
+              <a:latin typeface="Avenir Next" panose="020B0503020202020204" pitchFamily="34" charset="0"/>
+            </a:endParaRPr>
+          </a:p>
+          <a:p>
+            <a:pPr marL="342900" indent="-342900">
+              <a:buFont typeface="Arial" panose="020B0604020202020204" pitchFamily="34" charset="0"/>
+              <a:buChar char="•"/>
+            </a:pPr>
+            <a:endParaRPr lang="en-US" dirty="0">
+              <a:solidFill>
+                <a:schemeClr val="bg1"/>
+              </a:solidFill>
+              <a:latin typeface="Avenir Next" panose="020B0503020202020204" pitchFamily="34" charset="0"/>
+            </a:endParaRPr>
+          </a:p>
+          <a:p>
+            <a:pPr marL="285750" indent="-285750">
+              <a:buFont typeface="Arial" panose="020B0604020202020204" pitchFamily="34" charset="0"/>
+              <a:buChar char="•"/>
+            </a:pPr>
+            <a:r>
+              <a:rPr lang="en-US" dirty="0" smtClean="0">
+                <a:solidFill>
+                  <a:schemeClr val="bg1"/>
+                </a:solidFill>
+                <a:latin typeface="Avenir Next" panose="020B0503020202020204" pitchFamily="34" charset="0"/>
+              </a:rPr>
+              <a:t>Lessons:</a:t>
+            </a:r>
+          </a:p>
+          <a:p>
+            <a:pPr marL="742950" lvl="1" indent="-285750">
+              <a:buFont typeface="Arial" panose="020B0604020202020204" pitchFamily="34" charset="0"/>
+              <a:buChar char="•"/>
+            </a:pPr>
+            <a:r>
+              <a:rPr lang="en-US" dirty="0" smtClean="0">
+                <a:solidFill>
+                  <a:schemeClr val="bg1"/>
+                </a:solidFill>
+                <a:latin typeface="Avenir Next" panose="020B0503020202020204" pitchFamily="34" charset="0"/>
+              </a:rPr>
+              <a:t>Introduction </a:t>
+            </a:r>
+            <a:r>
+              <a:rPr lang="en-US" dirty="0">
+                <a:solidFill>
+                  <a:schemeClr val="bg1"/>
+                </a:solidFill>
+                <a:latin typeface="Avenir Next" panose="020B0503020202020204" pitchFamily="34" charset="0"/>
+              </a:rPr>
+              <a:t>to </a:t>
+            </a:r>
+            <a:r>
+              <a:rPr lang="en-US" dirty="0" err="1">
+                <a:solidFill>
+                  <a:schemeClr val="bg1"/>
+                </a:solidFill>
+                <a:latin typeface="Avenir Next" panose="020B0503020202020204" pitchFamily="34" charset="0"/>
+              </a:rPr>
+              <a:t>Github</a:t>
+            </a:r>
+            <a:endParaRPr lang="en-US" dirty="0">
+              <a:solidFill>
+                <a:schemeClr val="bg1"/>
+              </a:solidFill>
+              <a:latin typeface="Avenir Next" panose="020B0503020202020204" pitchFamily="34" charset="0"/>
+            </a:endParaRPr>
+          </a:p>
+          <a:p>
+            <a:pPr marL="742950" lvl="1" indent="-285750">
+              <a:buFont typeface="Arial" panose="020B0604020202020204" pitchFamily="34" charset="0"/>
+              <a:buChar char="•"/>
+            </a:pPr>
+            <a:r>
+              <a:rPr lang="en-US" dirty="0">
+                <a:solidFill>
+                  <a:schemeClr val="bg1"/>
+                </a:solidFill>
+                <a:latin typeface="Avenir Next" panose="020B0503020202020204" pitchFamily="34" charset="0"/>
+              </a:rPr>
+              <a:t>Introduction to </a:t>
+            </a:r>
+            <a:r>
+              <a:rPr lang="en-US" dirty="0" err="1">
+                <a:solidFill>
+                  <a:schemeClr val="bg1"/>
+                </a:solidFill>
+                <a:latin typeface="Avenir Next" panose="020B0503020202020204" pitchFamily="34" charset="0"/>
+              </a:rPr>
+              <a:t>OpenRefine</a:t>
+            </a:r>
+            <a:endParaRPr lang="en-US" dirty="0">
+              <a:solidFill>
+                <a:schemeClr val="bg1"/>
+              </a:solidFill>
+              <a:latin typeface="Avenir Next" panose="020B0503020202020204" pitchFamily="34" charset="0"/>
+            </a:endParaRPr>
+          </a:p>
+          <a:p>
+            <a:pPr marL="742950" lvl="1" indent="-285750">
+              <a:buFont typeface="Arial" panose="020B0604020202020204" pitchFamily="34" charset="0"/>
+              <a:buChar char="•"/>
+            </a:pPr>
+            <a:r>
+              <a:rPr lang="en-US" dirty="0">
+                <a:solidFill>
+                  <a:schemeClr val="bg1"/>
+                </a:solidFill>
+                <a:latin typeface="Avenir Next" panose="020B0503020202020204" pitchFamily="34" charset="0"/>
+              </a:rPr>
+              <a:t>The UNIX </a:t>
+            </a:r>
+            <a:r>
+              <a:rPr lang="en-US" dirty="0" smtClean="0">
+                <a:solidFill>
+                  <a:schemeClr val="bg1"/>
+                </a:solidFill>
+                <a:latin typeface="Avenir Next" panose="020B0503020202020204" pitchFamily="34" charset="0"/>
+              </a:rPr>
+              <a:t>Shell</a:t>
+            </a:r>
+          </a:p>
+          <a:p>
+            <a:pPr marL="742950" lvl="1" indent="-285750">
+              <a:buFont typeface="Arial" panose="020B0604020202020204" pitchFamily="34" charset="0"/>
+              <a:buChar char="•"/>
+            </a:pPr>
+            <a:r>
+              <a:rPr lang="en-US" dirty="0" smtClean="0">
+                <a:solidFill>
+                  <a:schemeClr val="bg1"/>
+                </a:solidFill>
+                <a:latin typeface="Avenir Next" panose="020B0503020202020204" pitchFamily="34" charset="0"/>
+              </a:rPr>
+              <a:t>Introduction </a:t>
+            </a:r>
+            <a:r>
+              <a:rPr lang="en-US" dirty="0">
+                <a:solidFill>
+                  <a:schemeClr val="bg1"/>
+                </a:solidFill>
+                <a:latin typeface="Avenir Next" panose="020B0503020202020204" pitchFamily="34" charset="0"/>
+              </a:rPr>
+              <a:t>to working with data and Regular </a:t>
+            </a:r>
+            <a:r>
+              <a:rPr lang="en-US" dirty="0" smtClean="0">
+                <a:solidFill>
+                  <a:schemeClr val="bg1"/>
+                </a:solidFill>
+                <a:latin typeface="Avenir Next" panose="020B0503020202020204" pitchFamily="34" charset="0"/>
+              </a:rPr>
+              <a:t>Expressions</a:t>
+            </a:r>
+            <a:endParaRPr lang="en-US" dirty="0">
+              <a:solidFill>
+                <a:schemeClr val="bg1"/>
+              </a:solidFill>
+              <a:latin typeface="Avenir Next" panose="020B0503020202020204" pitchFamily="34" charset="0"/>
+            </a:endParaRPr>
+          </a:p>
+        </p:txBody>
+      </p:sp>
+      <p:sp>
+        <p:nvSpPr>
+          <p:cNvPr id="7" name="TextBox 6">
+            <a:extLst>
+              <a:ext uri="{FF2B5EF4-FFF2-40B4-BE49-F238E27FC236}">
+                <a16:creationId xmlns:a16="http://schemas.microsoft.com/office/drawing/2014/main" id="{2DA5F819-53F8-114C-AD1D-0783565C82A1}"/>
+              </a:ext>
+            </a:extLst>
+          </p:cNvPr>
+          <p:cNvSpPr txBox="1"/>
+          <p:nvPr/>
+        </p:nvSpPr>
+        <p:spPr>
+          <a:xfrm>
+            <a:off x="10780873" y="146884"/>
+            <a:ext cx="1325043" cy="369332"/>
+          </a:xfrm>
+          <a:prstGeom prst="rect">
+            <a:avLst/>
+          </a:prstGeom>
+          <a:noFill/>
+        </p:spPr>
+        <p:txBody>
+          <a:bodyPr wrap="none" rtlCol="0">
+            <a:spAutoFit/>
+          </a:bodyPr>
+          <a:lstStyle/>
+          <a:p>
+            <a:r>
+              <a:rPr lang="en-US" dirty="0">
+                <a:solidFill>
+                  <a:schemeClr val="bg1"/>
+                </a:solidFill>
+                <a:latin typeface="Avenir Next Medium" panose="020B0503020202020204" pitchFamily="34" charset="0"/>
+              </a:rPr>
+              <a:t>MAC 2021</a:t>
+            </a:r>
           </a:p>
         </p:txBody>
       </p:sp>
@@ -3477,46 +3780,6 @@
       </p:grpSpPr>
       <p:sp>
         <p:nvSpPr>
-          <p:cNvPr id="2" name="TextBox 1">
-            <a:extLst>
-              <a:ext uri="{FF2B5EF4-FFF2-40B4-BE49-F238E27FC236}">
-                <a16:creationId xmlns:a16="http://schemas.microsoft.com/office/drawing/2014/main" id="{2788E1C9-79BA-7440-B006-72C422F8014E}"/>
-              </a:ext>
-            </a:extLst>
-          </p:cNvPr>
-          <p:cNvSpPr txBox="1"/>
-          <p:nvPr/>
-        </p:nvSpPr>
-        <p:spPr>
-          <a:xfrm>
-            <a:off x="2060676" y="584790"/>
-            <a:ext cx="7722050" cy="923330"/>
-          </a:xfrm>
-          <a:prstGeom prst="rect">
-            <a:avLst/>
-          </a:prstGeom>
-          <a:noFill/>
-        </p:spPr>
-        <p:txBody>
-          <a:bodyPr wrap="none" rtlCol="0">
-            <a:spAutoFit/>
-          </a:bodyPr>
-          <a:lstStyle/>
-          <a:p>
-            <a:r>
-              <a:rPr lang="en-US" sz="5400" b="1" dirty="0">
-                <a:solidFill>
-                  <a:schemeClr val="bg1"/>
-                </a:solidFill>
-                <a:latin typeface="Avenir Next Demi Bold" panose="020B0503020202020204" pitchFamily="34" charset="0"/>
-              </a:rPr>
-              <a:t>Our experience with LC</a:t>
-            </a:r>
-          </a:p>
-        </p:txBody>
-      </p:sp>
-      <p:sp>
-        <p:nvSpPr>
           <p:cNvPr id="3" name="TextBox 2">
             <a:extLst>
               <a:ext uri="{FF2B5EF4-FFF2-40B4-BE49-F238E27FC236}">
@@ -3707,16 +3970,7 @@
                 </a:solidFill>
                 <a:latin typeface="Avenir Next" panose="020B0503020202020204" pitchFamily="34" charset="0"/>
               </a:rPr>
-              <a:t>Keeping everyone together in </a:t>
-            </a:r>
-            <a:r>
-              <a:rPr lang="en-US" sz="2000">
-                <a:solidFill>
-                  <a:schemeClr val="bg1"/>
-                </a:solidFill>
-                <a:latin typeface="Avenir Next" panose="020B0503020202020204" pitchFamily="34" charset="0"/>
-              </a:rPr>
-              <a:t>virtual environment</a:t>
+              <a:t>Keeping everyone together in virtual environment</a:t>
             </a:r>
           </a:p>
           <a:p>
@@ -3725,22 +3979,99 @@
               <a:buChar char="•"/>
             </a:pPr>
             <a:r>
-              <a:rPr lang="en-US" sz="2000">
+              <a:rPr lang="en-US" sz="2000" dirty="0">
                 <a:solidFill>
                   <a:schemeClr val="bg1"/>
                 </a:solidFill>
                 <a:latin typeface="Avenir Next" panose="020B0503020202020204" pitchFamily="34" charset="0"/>
               </a:rPr>
-              <a:t>Harmonizing </a:t>
-            </a:r>
-            <a:r>
-              <a:rPr lang="en-US" sz="2000" dirty="0">
-                <a:solidFill>
-                  <a:schemeClr val="bg1"/>
-                </a:solidFill>
-                <a:latin typeface="Avenir Next" panose="020B0503020202020204" pitchFamily="34" charset="0"/>
-              </a:rPr>
-              <a:t>experience with multiple instructors</a:t>
+              <a:t>Harmonizing experience with multiple instructors</a:t>
+            </a:r>
+          </a:p>
+        </p:txBody>
+      </p:sp>
+      <p:sp>
+        <p:nvSpPr>
+          <p:cNvPr id="4" name="TextBox 3">
+            <a:extLst>
+              <a:ext uri="{FF2B5EF4-FFF2-40B4-BE49-F238E27FC236}">
+                <a16:creationId xmlns:a16="http://schemas.microsoft.com/office/drawing/2014/main" id="{2788E1C9-79BA-7440-B006-72C422F8014E}"/>
+              </a:ext>
+            </a:extLst>
+          </p:cNvPr>
+          <p:cNvSpPr txBox="1"/>
+          <p:nvPr/>
+        </p:nvSpPr>
+        <p:spPr>
+          <a:xfrm>
+            <a:off x="689344" y="170366"/>
+            <a:ext cx="7092006" cy="923330"/>
+          </a:xfrm>
+          <a:prstGeom prst="rect">
+            <a:avLst/>
+          </a:prstGeom>
+          <a:noFill/>
+        </p:spPr>
+        <p:txBody>
+          <a:bodyPr wrap="none" rtlCol="0">
+            <a:spAutoFit/>
+          </a:bodyPr>
+          <a:lstStyle/>
+          <a:p>
+            <a:r>
+              <a:rPr lang="en-US" sz="5400" b="1" dirty="0" smtClean="0">
+                <a:solidFill>
+                  <a:schemeClr val="bg1"/>
+                </a:solidFill>
+                <a:latin typeface="Avenir Next Demi Bold" panose="020B0503020202020204" pitchFamily="34" charset="0"/>
+              </a:rPr>
+              <a:t>Hosting &amp; helping LC </a:t>
+            </a:r>
+            <a:endParaRPr lang="en-US" sz="5400" b="1" dirty="0">
+              <a:solidFill>
+                <a:schemeClr val="bg1"/>
+              </a:solidFill>
+              <a:latin typeface="Avenir Next Demi Bold" panose="020B0503020202020204" pitchFamily="34" charset="0"/>
+            </a:endParaRPr>
+          </a:p>
+        </p:txBody>
+      </p:sp>
+      <p:sp>
+        <p:nvSpPr>
+          <p:cNvPr id="6" name="TextBox 5">
+            <a:extLst>
+              <a:ext uri="{FF2B5EF4-FFF2-40B4-BE49-F238E27FC236}">
+                <a16:creationId xmlns:a16="http://schemas.microsoft.com/office/drawing/2014/main" id="{2DA5F819-53F8-114C-AD1D-0783565C82A1}"/>
+              </a:ext>
+            </a:extLst>
+          </p:cNvPr>
+          <p:cNvSpPr txBox="1"/>
+          <p:nvPr/>
+        </p:nvSpPr>
+        <p:spPr>
+          <a:xfrm>
+            <a:off x="10780873" y="146884"/>
+            <a:ext cx="1325043" cy="369332"/>
+          </a:xfrm>
+          <a:prstGeom prst="rect">
+            <a:avLst/>
+          </a:prstGeom>
+          <a:noFill/>
+        </p:spPr>
+        <p:txBody>
+          <a:bodyPr wrap="none" rtlCol="0">
+            <a:spAutoFit/>
+          </a:bodyPr>
+          <a:lstStyle/>
+          <a:p>
+            <a:r>
+              <a:rPr lang="en-US" dirty="0">
+                <a:solidFill>
+                  <a:schemeClr val="bg1"/>
+                </a:solidFill>
+                <a:latin typeface="Avenir Next Medium" panose="020B0503020202020204" pitchFamily="34" charset="0"/>
+              </a:rPr>
+              <a:t>MAC 2021</a:t>
             </a:r>
           </a:p>
         </p:txBody>
@@ -3791,7 +4122,7 @@
       </p:grpSpPr>
       <p:sp>
         <p:nvSpPr>
-          <p:cNvPr id="2" name="TextBox 1">
+          <p:cNvPr id="3" name="TextBox 2">
             <a:extLst>
               <a:ext uri="{FF2B5EF4-FFF2-40B4-BE49-F238E27FC236}">
                 <a16:creationId xmlns:a16="http://schemas.microsoft.com/office/drawing/2014/main" id="{2788E1C9-79BA-7440-B006-72C422F8014E}"/>
@@ -3803,8 +4134,8 @@
         </p:nvSpPr>
         <p:spPr>
           <a:xfrm>
-            <a:off x="2060676" y="988827"/>
-            <a:ext cx="8658204" cy="923330"/>
+            <a:off x="689344" y="170366"/>
+            <a:ext cx="8677375" cy="923330"/>
           </a:xfrm>
           <a:prstGeom prst="rect">
             <a:avLst/>
@@ -3818,14 +4149,218 @@
           <a:lstStyle/>
           <a:p>
             <a:r>
-              <a:rPr lang="en-US" sz="5400" b="1" dirty="0">
+              <a:rPr lang="en-US" sz="5400" b="1" dirty="0" smtClean="0">
                 <a:solidFill>
                   <a:schemeClr val="bg1"/>
                 </a:solidFill>
                 <a:latin typeface="Avenir Next Demi Bold" panose="020B0503020202020204" pitchFamily="34" charset="0"/>
               </a:rPr>
-              <a:t>Self-hosting LC workshops</a:t>
-            </a:r>
+              <a:t>Self-hosting &amp; teaching LC</a:t>
+            </a:r>
+            <a:endParaRPr lang="en-US" sz="5400" b="1" dirty="0">
+              <a:solidFill>
+                <a:schemeClr val="bg1"/>
+              </a:solidFill>
+              <a:latin typeface="Avenir Next Demi Bold" panose="020B0503020202020204" pitchFamily="34" charset="0"/>
+            </a:endParaRPr>
+          </a:p>
+        </p:txBody>
+      </p:sp>
+      <p:sp>
+        <p:nvSpPr>
+          <p:cNvPr id="5" name="TextBox 4">
+            <a:extLst>
+              <a:ext uri="{FF2B5EF4-FFF2-40B4-BE49-F238E27FC236}">
+                <a16:creationId xmlns:a16="http://schemas.microsoft.com/office/drawing/2014/main" id="{2DA5F819-53F8-114C-AD1D-0783565C82A1}"/>
+              </a:ext>
+            </a:extLst>
+          </p:cNvPr>
+          <p:cNvSpPr txBox="1"/>
+          <p:nvPr/>
+        </p:nvSpPr>
+        <p:spPr>
+          <a:xfrm>
+            <a:off x="10780873" y="146884"/>
+            <a:ext cx="1325043" cy="369332"/>
+          </a:xfrm>
+          <a:prstGeom prst="rect">
+            <a:avLst/>
+          </a:prstGeom>
+          <a:noFill/>
+        </p:spPr>
+        <p:txBody>
+          <a:bodyPr wrap="none" rtlCol="0">
+            <a:spAutoFit/>
+          </a:bodyPr>
+          <a:lstStyle/>
+          <a:p>
+            <a:r>
+              <a:rPr lang="en-US" dirty="0">
+                <a:solidFill>
+                  <a:schemeClr val="bg1"/>
+                </a:solidFill>
+                <a:latin typeface="Avenir Next Medium" panose="020B0503020202020204" pitchFamily="34" charset="0"/>
+              </a:rPr>
+              <a:t>MAC 2021</a:t>
+            </a:r>
+          </a:p>
+        </p:txBody>
+      </p:sp>
+      <p:sp>
+        <p:nvSpPr>
+          <p:cNvPr id="7" name="TextBox 6">
+            <a:extLst>
+              <a:ext uri="{FF2B5EF4-FFF2-40B4-BE49-F238E27FC236}">
+                <a16:creationId xmlns:a16="http://schemas.microsoft.com/office/drawing/2014/main" id="{9B84586B-2FCD-D349-B5FB-8D1B5582CC90}"/>
+              </a:ext>
+            </a:extLst>
+          </p:cNvPr>
+          <p:cNvSpPr txBox="1"/>
+          <p:nvPr/>
+        </p:nvSpPr>
+        <p:spPr>
+          <a:xfrm>
+            <a:off x="689344" y="1591841"/>
+            <a:ext cx="10813312" cy="2554545"/>
+          </a:xfrm>
+          <a:prstGeom prst="rect">
+            <a:avLst/>
+          </a:prstGeom>
+          <a:noFill/>
+        </p:spPr>
+        <p:txBody>
+          <a:bodyPr wrap="square" rtlCol="0">
+            <a:spAutoFit/>
+          </a:bodyPr>
+          <a:lstStyle/>
+          <a:p>
+            <a:pPr marL="342900" indent="-342900">
+              <a:buFont typeface="Arial" panose="020B0604020202020204" pitchFamily="34" charset="0"/>
+              <a:buChar char="•"/>
+            </a:pPr>
+            <a:r>
+              <a:rPr lang="en-US" sz="2000" dirty="0">
+                <a:solidFill>
+                  <a:schemeClr val="bg1"/>
+                </a:solidFill>
+                <a:latin typeface="Avenir Next" panose="020B0503020202020204" pitchFamily="34" charset="0"/>
+              </a:rPr>
+              <a:t>3 in-house certified LC </a:t>
+            </a:r>
+            <a:r>
+              <a:rPr lang="en-US" sz="2000" dirty="0" smtClean="0">
+                <a:solidFill>
+                  <a:schemeClr val="bg1"/>
+                </a:solidFill>
+                <a:latin typeface="Avenir Next" panose="020B0503020202020204" pitchFamily="34" charset="0"/>
+              </a:rPr>
+              <a:t>instructors with history of collaboration</a:t>
+            </a:r>
+          </a:p>
+          <a:p>
+            <a:pPr marL="800100" lvl="1" indent="-342900">
+              <a:buFont typeface="Arial" panose="020B0604020202020204" pitchFamily="34" charset="0"/>
+              <a:buChar char="•"/>
+            </a:pPr>
+            <a:endParaRPr lang="en-US" sz="2000" dirty="0">
+              <a:solidFill>
+                <a:schemeClr val="bg1"/>
+              </a:solidFill>
+              <a:latin typeface="Avenir Next" panose="020B0503020202020204" pitchFamily="34" charset="0"/>
+            </a:endParaRPr>
+          </a:p>
+          <a:p>
+            <a:pPr marL="342900" indent="-342900">
+              <a:buFont typeface="Arial" panose="020B0604020202020204" pitchFamily="34" charset="0"/>
+              <a:buChar char="•"/>
+            </a:pPr>
+            <a:r>
+              <a:rPr lang="en-US" sz="2000" dirty="0" smtClean="0">
+                <a:solidFill>
+                  <a:schemeClr val="bg1"/>
+                </a:solidFill>
+                <a:latin typeface="Avenir Next" panose="020B0503020202020204" pitchFamily="34" charset="0"/>
+              </a:rPr>
+              <a:t>More control over:</a:t>
+            </a:r>
+          </a:p>
+          <a:p>
+            <a:pPr marL="800100" lvl="1" indent="-342900">
+              <a:buFont typeface="Arial" panose="020B0604020202020204" pitchFamily="34" charset="0"/>
+              <a:buChar char="•"/>
+            </a:pPr>
+            <a:r>
+              <a:rPr lang="en-US" sz="2000" dirty="0" smtClean="0">
+                <a:solidFill>
+                  <a:schemeClr val="bg1"/>
+                </a:solidFill>
+                <a:latin typeface="Avenir Next" panose="020B0503020202020204" pitchFamily="34" charset="0"/>
+              </a:rPr>
+              <a:t>administrative timelines</a:t>
+            </a:r>
+          </a:p>
+          <a:p>
+            <a:pPr marL="800100" lvl="1" indent="-342900">
+              <a:buFont typeface="Arial" panose="020B0604020202020204" pitchFamily="34" charset="0"/>
+              <a:buChar char="•"/>
+            </a:pPr>
+            <a:r>
+              <a:rPr lang="en-US" sz="2000" dirty="0" smtClean="0">
+                <a:solidFill>
+                  <a:schemeClr val="bg1"/>
+                </a:solidFill>
+                <a:latin typeface="Avenir Next" panose="020B0503020202020204" pitchFamily="34" charset="0"/>
+              </a:rPr>
+              <a:t>promotion timeline</a:t>
+            </a:r>
+          </a:p>
+          <a:p>
+            <a:pPr marL="800100" lvl="1" indent="-342900">
+              <a:buFont typeface="Arial" panose="020B0604020202020204" pitchFamily="34" charset="0"/>
+              <a:buChar char="•"/>
+            </a:pPr>
+            <a:r>
+              <a:rPr lang="en-US" sz="2000" dirty="0" smtClean="0">
+                <a:solidFill>
+                  <a:schemeClr val="bg1"/>
+                </a:solidFill>
+                <a:latin typeface="Avenir Next" panose="020B0503020202020204" pitchFamily="34" charset="0"/>
+              </a:rPr>
+              <a:t>instructor buy-in</a:t>
+            </a:r>
+          </a:p>
+          <a:p>
+            <a:pPr marL="342900" indent="-342900">
+              <a:buFont typeface="Arial" panose="020B0604020202020204" pitchFamily="34" charset="0"/>
+              <a:buChar char="•"/>
+            </a:pPr>
+            <a:endParaRPr lang="en-US" sz="2000" dirty="0" smtClean="0">
+              <a:solidFill>
+                <a:schemeClr val="bg1"/>
+              </a:solidFill>
+              <a:latin typeface="Avenir Next" panose="020B0503020202020204" pitchFamily="34" charset="0"/>
+            </a:endParaRPr>
+          </a:p>
+          <a:p>
+            <a:pPr marL="342900" indent="-342900">
+              <a:buFont typeface="Arial" panose="020B0604020202020204" pitchFamily="34" charset="0"/>
+              <a:buChar char="•"/>
+            </a:pPr>
+            <a:r>
+              <a:rPr lang="en-US" sz="2000" dirty="0" smtClean="0">
+                <a:solidFill>
+                  <a:schemeClr val="bg1"/>
+                </a:solidFill>
+                <a:latin typeface="Avenir Next" panose="020B0503020202020204" pitchFamily="34" charset="0"/>
+              </a:rPr>
+              <a:t>No fee paid to the central Carpentries organization (approx. $XXX HOW MUCH WAS IT?)</a:t>
+            </a:r>
+            <a:endParaRPr lang="en-US" sz="2000" dirty="0">
+              <a:solidFill>
+                <a:schemeClr val="bg1"/>
+              </a:solidFill>
+              <a:latin typeface="Avenir Next" panose="020B0503020202020204" pitchFamily="34" charset="0"/>
+            </a:endParaRPr>
           </a:p>
         </p:txBody>
       </p:sp>
@@ -3938,8 +4473,8 @@
         </p:nvSpPr>
         <p:spPr>
           <a:xfrm>
-            <a:off x="2764715" y="2848294"/>
-            <a:ext cx="7623294" cy="646331"/>
+            <a:off x="4948865" y="4193597"/>
+            <a:ext cx="7157051" cy="1077218"/>
           </a:xfrm>
           <a:prstGeom prst="rect">
             <a:avLst/>
@@ -3953,25 +4488,20 @@
           <a:lstStyle/>
           <a:p>
             <a:r>
-              <a:rPr lang="en-US" dirty="0">
+              <a:rPr lang="en-US" sz="1600" i="1" dirty="0">
                 <a:solidFill>
                   <a:schemeClr val="bg1"/>
                 </a:solidFill>
                 <a:latin typeface="Avenir Next Medium" panose="020B0503020202020204" pitchFamily="34" charset="0"/>
               </a:rPr>
-              <a:t>Partial funding made possible by the (acknowledgement goes here)</a:t>
-            </a:r>
-          </a:p>
-          <a:p>
-            <a:r>
-              <a:rPr lang="en-US" dirty="0">
-                <a:solidFill>
-                  <a:schemeClr val="bg1"/>
-                </a:solidFill>
-                <a:latin typeface="Avenir Next Medium" panose="020B0503020202020204" pitchFamily="34" charset="0"/>
-              </a:rPr>
-              <a:t>Cooperative agreement # UG4 LM013724</a:t>
-            </a:r>
+              <a:t>This project has been funded in whole or in part with Federal funds from the National Library of Medicine, National Institutes of Health, Department of Health and Human Services, under Cooperative Agreement Number UG4LM013724 with the University of Maryland, Baltimore.</a:t>
+            </a:r>
+            <a:endParaRPr lang="en-US" sz="1600" i="1" dirty="0">
+              <a:solidFill>
+                <a:schemeClr val="bg1"/>
+              </a:solidFill>
+              <a:latin typeface="Avenir Next Medium" panose="020B0503020202020204" pitchFamily="34" charset="0"/>
+            </a:endParaRPr>
           </a:p>
         </p:txBody>
       </p:sp>
@@ -4030,7 +4560,7 @@
           <p:nvPr/>
         </p:nvPicPr>
         <p:blipFill>
-          <a:blip r:embed="rId3">
+          <a:blip r:embed="rId3" cstate="print">
             <a:extLst>
               <a:ext uri="{28A0092B-C50C-407E-A947-70E740481C1C}">
                 <a14:useLocalDpi xmlns:a14="http://schemas.microsoft.com/office/drawing/2010/main" val="0"/>
@@ -4043,7 +4573,7 @@
         </p:blipFill>
         <p:spPr>
           <a:xfrm>
-            <a:off x="4194544" y="3762117"/>
+            <a:off x="5075411" y="3531834"/>
             <a:ext cx="3802912" cy="610149"/>
           </a:xfrm>
           <a:prstGeom prst="rect">

</xml_diff>

<commit_message>
Make consistent colons and fonts, ship MVP
</commit_message>
<xml_diff>
--- a/slides.pptx
+++ b/slides.pptx
@@ -245,7 +245,7 @@
           <a:p>
             <a:fld id="{472417AA-5186-4DA5-8FC7-94E6CE6234FF}" type="datetimeFigureOut">
               <a:rPr lang="en-US" smtClean="0"/>
-              <a:t>10/15/2021</a:t>
+              <a:t>10/15/21</a:t>
             </a:fld>
             <a:endParaRPr lang="en-US"/>
           </a:p>
@@ -413,7 +413,7 @@
           <a:p>
             <a:fld id="{472417AA-5186-4DA5-8FC7-94E6CE6234FF}" type="datetimeFigureOut">
               <a:rPr lang="en-US" smtClean="0"/>
-              <a:t>10/15/2021</a:t>
+              <a:t>10/15/21</a:t>
             </a:fld>
             <a:endParaRPr lang="en-US"/>
           </a:p>
@@ -591,7 +591,7 @@
           <a:p>
             <a:fld id="{472417AA-5186-4DA5-8FC7-94E6CE6234FF}" type="datetimeFigureOut">
               <a:rPr lang="en-US" smtClean="0"/>
-              <a:t>10/15/2021</a:t>
+              <a:t>10/15/21</a:t>
             </a:fld>
             <a:endParaRPr lang="en-US"/>
           </a:p>
@@ -759,7 +759,7 @@
           <a:p>
             <a:fld id="{472417AA-5186-4DA5-8FC7-94E6CE6234FF}" type="datetimeFigureOut">
               <a:rPr lang="en-US" smtClean="0"/>
-              <a:t>10/15/2021</a:t>
+              <a:t>10/15/21</a:t>
             </a:fld>
             <a:endParaRPr lang="en-US"/>
           </a:p>
@@ -1004,7 +1004,7 @@
           <a:p>
             <a:fld id="{472417AA-5186-4DA5-8FC7-94E6CE6234FF}" type="datetimeFigureOut">
               <a:rPr lang="en-US" smtClean="0"/>
-              <a:t>10/15/2021</a:t>
+              <a:t>10/15/21</a:t>
             </a:fld>
             <a:endParaRPr lang="en-US"/>
           </a:p>
@@ -1233,7 +1233,7 @@
           <a:p>
             <a:fld id="{472417AA-5186-4DA5-8FC7-94E6CE6234FF}" type="datetimeFigureOut">
               <a:rPr lang="en-US" smtClean="0"/>
-              <a:t>10/15/2021</a:t>
+              <a:t>10/15/21</a:t>
             </a:fld>
             <a:endParaRPr lang="en-US"/>
           </a:p>
@@ -1597,7 +1597,7 @@
           <a:p>
             <a:fld id="{472417AA-5186-4DA5-8FC7-94E6CE6234FF}" type="datetimeFigureOut">
               <a:rPr lang="en-US" smtClean="0"/>
-              <a:t>10/15/2021</a:t>
+              <a:t>10/15/21</a:t>
             </a:fld>
             <a:endParaRPr lang="en-US"/>
           </a:p>
@@ -1714,7 +1714,7 @@
           <a:p>
             <a:fld id="{472417AA-5186-4DA5-8FC7-94E6CE6234FF}" type="datetimeFigureOut">
               <a:rPr lang="en-US" smtClean="0"/>
-              <a:t>10/15/2021</a:t>
+              <a:t>10/15/21</a:t>
             </a:fld>
             <a:endParaRPr lang="en-US"/>
           </a:p>
@@ -1809,7 +1809,7 @@
           <a:p>
             <a:fld id="{472417AA-5186-4DA5-8FC7-94E6CE6234FF}" type="datetimeFigureOut">
               <a:rPr lang="en-US" smtClean="0"/>
-              <a:t>10/15/2021</a:t>
+              <a:t>10/15/21</a:t>
             </a:fld>
             <a:endParaRPr lang="en-US"/>
           </a:p>
@@ -2084,7 +2084,7 @@
           <a:p>
             <a:fld id="{472417AA-5186-4DA5-8FC7-94E6CE6234FF}" type="datetimeFigureOut">
               <a:rPr lang="en-US" smtClean="0"/>
-              <a:t>10/15/2021</a:t>
+              <a:t>10/15/21</a:t>
             </a:fld>
             <a:endParaRPr lang="en-US"/>
           </a:p>
@@ -2336,7 +2336,7 @@
           <a:p>
             <a:fld id="{472417AA-5186-4DA5-8FC7-94E6CE6234FF}" type="datetimeFigureOut">
               <a:rPr lang="en-US" smtClean="0"/>
-              <a:t>10/15/2021</a:t>
+              <a:t>10/15/21</a:t>
             </a:fld>
             <a:endParaRPr lang="en-US"/>
           </a:p>
@@ -2547,7 +2547,7 @@
           <a:p>
             <a:fld id="{472417AA-5186-4DA5-8FC7-94E6CE6234FF}" type="datetimeFigureOut">
               <a:rPr lang="en-US" smtClean="0"/>
-              <a:t>10/15/2021</a:t>
+              <a:t>10/15/21</a:t>
             </a:fld>
             <a:endParaRPr lang="en-US"/>
           </a:p>
@@ -3172,7 +3172,7 @@
                 <a:solidFill>
                   <a:schemeClr val="bg1"/>
                 </a:solidFill>
-                <a:latin typeface="Avenir Next Medium" panose="020B0503020202020204" pitchFamily="34" charset="0"/>
+                <a:latin typeface="Avenir Next Ultra Light" panose="020B0203020202020204" pitchFamily="34" charset="77"/>
               </a:rPr>
               <a:t>MAC 2021</a:t>
             </a:r>
@@ -3238,7 +3238,7 @@
         <p:spPr>
           <a:xfrm>
             <a:off x="689344" y="170366"/>
-            <a:ext cx="6655155" cy="923330"/>
+            <a:ext cx="6285119" cy="923330"/>
           </a:xfrm>
           <a:prstGeom prst="rect">
             <a:avLst/>
@@ -3252,7 +3252,7 @@
           <a:lstStyle/>
           <a:p>
             <a:r>
-              <a:rPr lang="en-US" sz="5400" b="1" dirty="0" smtClean="0">
+              <a:rPr lang="en-US" sz="5400" b="1" dirty="0">
                 <a:solidFill>
                   <a:schemeClr val="bg1"/>
                 </a:solidFill>
@@ -3260,12 +3260,6 @@
               </a:rPr>
               <a:t>Library Carpentry? </a:t>
             </a:r>
-            <a:endParaRPr lang="en-US" sz="5400" b="1" dirty="0">
-              <a:solidFill>
-                <a:schemeClr val="bg1"/>
-              </a:solidFill>
-              <a:latin typeface="Avenir Next Demi Bold" panose="020B0503020202020204" pitchFamily="34" charset="0"/>
-            </a:endParaRPr>
           </a:p>
         </p:txBody>
       </p:sp>
@@ -3323,17 +3317,10 @@
                 </a:solidFill>
                 <a:latin typeface="Avenir Next" panose="020B0503020202020204" pitchFamily="34" charset="0"/>
               </a:rPr>
-              <a:t>Library Carpentry (LC) is a subset of the Carpentries curriculum </a:t>
-            </a:r>
-            <a:r>
-              <a:rPr lang="en-US" sz="2000" dirty="0" smtClean="0">
-                <a:solidFill>
-                  <a:schemeClr val="bg1"/>
-                </a:solidFill>
-                <a:latin typeface="Avenir Next" panose="020B0503020202020204" pitchFamily="34" charset="0"/>
-              </a:rPr>
-              <a:t>directed library staff.</a:t>
-            </a:r>
+              <a:t>Library Carpentry (LC) is a subset of the Carpentries curriculum directed library staff.</a:t>
+            </a:r>
+          </a:p>
+          <a:p>
             <a:endParaRPr lang="en-US" sz="2000" dirty="0">
               <a:solidFill>
                 <a:schemeClr val="bg1"/>
@@ -3342,14 +3329,6 @@
             </a:endParaRPr>
           </a:p>
           <a:p>
-            <a:endParaRPr lang="en-US" sz="2000" dirty="0">
-              <a:solidFill>
-                <a:schemeClr val="bg1"/>
-              </a:solidFill>
-              <a:latin typeface="Avenir Next" panose="020B0503020202020204" pitchFamily="34" charset="0"/>
-            </a:endParaRPr>
-          </a:p>
-          <a:p>
             <a:r>
               <a:rPr lang="en-US" sz="2000" dirty="0">
                 <a:solidFill>
@@ -3357,16 +3336,7 @@
                 </a:solidFill>
                 <a:latin typeface="Avenir Next" panose="020B0503020202020204" pitchFamily="34" charset="0"/>
               </a:rPr>
-              <a:t>A common LC </a:t>
-            </a:r>
-            <a:r>
-              <a:rPr lang="en-US" sz="2000" dirty="0" smtClean="0">
-                <a:solidFill>
-                  <a:schemeClr val="bg1"/>
-                </a:solidFill>
-                <a:latin typeface="Avenir Next" panose="020B0503020202020204" pitchFamily="34" charset="0"/>
-              </a:rPr>
-              <a:t>workshop:</a:t>
+              <a:t>A common LC workshop</a:t>
             </a:r>
           </a:p>
         </p:txBody>
@@ -3404,23 +3374,8 @@
                 </a:solidFill>
                 <a:latin typeface="Avenir Next" panose="020B0503020202020204" pitchFamily="34" charset="0"/>
               </a:rPr>
-              <a:t>2 days long, </a:t>
-            </a:r>
-            <a:r>
-              <a:rPr lang="en-US" dirty="0" smtClean="0">
-                <a:solidFill>
-                  <a:schemeClr val="bg1"/>
-                </a:solidFill>
-                <a:latin typeface="Avenir Next" panose="020B0503020202020204" pitchFamily="34" charset="0"/>
-              </a:rPr>
-              <a:t>~7hrs/day</a:t>
-            </a:r>
-            <a:endParaRPr lang="en-US" dirty="0">
-              <a:solidFill>
-                <a:schemeClr val="bg1"/>
-              </a:solidFill>
-              <a:latin typeface="Avenir Next" panose="020B0503020202020204" pitchFamily="34" charset="0"/>
-            </a:endParaRPr>
+              <a:t>2 days long, ~7hrs/day</a:t>
+            </a:r>
           </a:p>
           <a:p>
             <a:pPr marL="342900" indent="-342900">
@@ -3443,7 +3398,7 @@
               <a:buChar char="•"/>
             </a:pPr>
             <a:r>
-              <a:rPr lang="en-US" dirty="0" smtClean="0">
+              <a:rPr lang="en-US" dirty="0">
                 <a:solidFill>
                   <a:schemeClr val="bg1"/>
                 </a:solidFill>
@@ -3458,7 +3413,7 @@
               <a:buChar char="•"/>
             </a:pPr>
             <a:r>
-              <a:rPr lang="en-US" dirty="0" smtClean="0">
+              <a:rPr lang="en-US" dirty="0">
                 <a:solidFill>
                   <a:schemeClr val="bg1"/>
                 </a:solidFill>
@@ -3467,7 +3422,7 @@
               <a:t>Zoom, </a:t>
             </a:r>
             <a:r>
-              <a:rPr lang="en-US" dirty="0" err="1" smtClean="0">
+              <a:rPr lang="en-US" dirty="0" err="1">
                 <a:solidFill>
                   <a:schemeClr val="bg1"/>
                 </a:solidFill>
@@ -3476,7 +3431,7 @@
               <a:t>etc</a:t>
             </a:r>
             <a:r>
-              <a:rPr lang="en-US" dirty="0" smtClean="0">
+              <a:rPr lang="en-US" dirty="0">
                 <a:solidFill>
                   <a:schemeClr val="bg1"/>
                 </a:solidFill>
@@ -3502,7 +3457,7 @@
               <a:buFont typeface="Arial" panose="020B0604020202020204" pitchFamily="34" charset="0"/>
               <a:buChar char="•"/>
             </a:pPr>
-            <a:endParaRPr lang="en-US" dirty="0" smtClean="0">
+            <a:endParaRPr lang="en-US" dirty="0">
               <a:solidFill>
                 <a:schemeClr val="bg1"/>
               </a:solidFill>
@@ -3526,7 +3481,7 @@
               <a:buFont typeface="Arial" panose="020B0604020202020204" pitchFamily="34" charset="0"/>
               <a:buChar char="•"/>
             </a:pPr>
-            <a:endParaRPr lang="en-US" dirty="0" smtClean="0">
+            <a:endParaRPr lang="en-US" dirty="0">
               <a:solidFill>
                 <a:schemeClr val="bg1"/>
               </a:solidFill>
@@ -3551,13 +3506,13 @@
               <a:buChar char="•"/>
             </a:pPr>
             <a:r>
-              <a:rPr lang="en-US" dirty="0" smtClean="0">
+              <a:rPr lang="en-US" dirty="0">
                 <a:solidFill>
                   <a:schemeClr val="bg1"/>
                 </a:solidFill>
                 <a:latin typeface="Avenir Next" panose="020B0503020202020204" pitchFamily="34" charset="0"/>
               </a:rPr>
-              <a:t>Lessons:</a:t>
+              <a:t>Lessons</a:t>
             </a:r>
           </a:p>
           <a:p>
@@ -3566,22 +3521,13 @@
               <a:buChar char="•"/>
             </a:pPr>
             <a:r>
-              <a:rPr lang="en-US" dirty="0" smtClean="0">
+              <a:rPr lang="en-US" dirty="0">
                 <a:solidFill>
                   <a:schemeClr val="bg1"/>
                 </a:solidFill>
                 <a:latin typeface="Avenir Next" panose="020B0503020202020204" pitchFamily="34" charset="0"/>
               </a:rPr>
-              <a:t>Introduction </a:t>
-            </a:r>
-            <a:r>
-              <a:rPr lang="en-US" dirty="0">
-                <a:solidFill>
-                  <a:schemeClr val="bg1"/>
-                </a:solidFill>
-                <a:latin typeface="Avenir Next" panose="020B0503020202020204" pitchFamily="34" charset="0"/>
-              </a:rPr>
-              <a:t>to </a:t>
+              <a:t>Introduction to </a:t>
             </a:r>
             <a:r>
               <a:rPr lang="en-US" dirty="0" err="1">
@@ -3641,16 +3587,7 @@
                 </a:solidFill>
                 <a:latin typeface="Avenir Next" panose="020B0503020202020204" pitchFamily="34" charset="0"/>
               </a:rPr>
-              <a:t>The UNIX </a:t>
-            </a:r>
-            <a:r>
-              <a:rPr lang="en-US" dirty="0" smtClean="0">
-                <a:solidFill>
-                  <a:schemeClr val="bg1"/>
-                </a:solidFill>
-                <a:latin typeface="Avenir Next" panose="020B0503020202020204" pitchFamily="34" charset="0"/>
-              </a:rPr>
-              <a:t>Shell</a:t>
+              <a:t>The UNIX Shell</a:t>
             </a:r>
           </a:p>
           <a:p>
@@ -3659,38 +3596,14 @@
               <a:buChar char="•"/>
             </a:pPr>
             <a:r>
-              <a:rPr lang="en-US" dirty="0" smtClean="0">
+              <a:rPr lang="en-US" dirty="0">
                 <a:solidFill>
                   <a:schemeClr val="bg1"/>
                 </a:solidFill>
                 <a:latin typeface="Avenir Next" panose="020B0503020202020204" pitchFamily="34" charset="0"/>
               </a:rPr>
-              <a:t>Introduction </a:t>
-            </a:r>
-            <a:r>
-              <a:rPr lang="en-US" dirty="0">
-                <a:solidFill>
-                  <a:schemeClr val="bg1"/>
-                </a:solidFill>
-                <a:latin typeface="Avenir Next" panose="020B0503020202020204" pitchFamily="34" charset="0"/>
-              </a:rPr>
-              <a:t>to working with data and Regular </a:t>
-            </a:r>
-            <a:r>
-              <a:rPr lang="en-US" dirty="0" smtClean="0">
-                <a:solidFill>
-                  <a:schemeClr val="bg1"/>
-                </a:solidFill>
-                <a:latin typeface="Avenir Next" panose="020B0503020202020204" pitchFamily="34" charset="0"/>
-              </a:rPr>
-              <a:t>Expressions</a:t>
-            </a:r>
-            <a:endParaRPr lang="en-US" dirty="0">
-              <a:solidFill>
-                <a:schemeClr val="bg1"/>
-              </a:solidFill>
-              <a:latin typeface="Avenir Next" panose="020B0503020202020204" pitchFamily="34" charset="0"/>
-            </a:endParaRPr>
+              <a:t>Introduction to working with data and Regular Expressions</a:t>
+            </a:r>
           </a:p>
         </p:txBody>
       </p:sp>
@@ -3727,7 +3640,7 @@
                 <a:solidFill>
                   <a:schemeClr val="bg1"/>
                 </a:solidFill>
-                <a:latin typeface="Avenir Next Medium" panose="020B0503020202020204" pitchFamily="34" charset="0"/>
+                <a:latin typeface="Avenir Next Ultra Light" panose="020B0203020202020204" pitchFamily="34" charset="77"/>
               </a:rPr>
               <a:t>MAC 2021</a:t>
             </a:r>
@@ -3792,8 +3705,8 @@
         </p:nvSpPr>
         <p:spPr>
           <a:xfrm>
-            <a:off x="689344" y="1423681"/>
-            <a:ext cx="10813312" cy="3170099"/>
+            <a:off x="689344" y="1296085"/>
+            <a:ext cx="10813312" cy="3785652"/>
           </a:xfrm>
           <a:prstGeom prst="rect">
             <a:avLst/>
@@ -3882,6 +3795,20 @@
               </a:rPr>
               <a:t>Advertising through NNLM channels</a:t>
             </a:r>
+            <a:br>
+              <a:rPr lang="en-US" sz="2000" dirty="0">
+                <a:solidFill>
+                  <a:schemeClr val="bg1"/>
+                </a:solidFill>
+                <a:latin typeface="Avenir Next" panose="020B0503020202020204" pitchFamily="34" charset="0"/>
+              </a:rPr>
+            </a:br>
+            <a:endParaRPr lang="en-US" sz="2000" dirty="0">
+              <a:solidFill>
+                <a:schemeClr val="bg1"/>
+              </a:solidFill>
+              <a:latin typeface="Avenir Next" panose="020B0503020202020204" pitchFamily="34" charset="0"/>
+            </a:endParaRPr>
           </a:p>
           <a:p>
             <a:pPr marL="342900" indent="-342900">
@@ -3936,6 +3863,14 @@
               </a:rPr>
               <a:t>OpenRefine</a:t>
             </a:r>
+            <a:br>
+              <a:rPr lang="en-US" sz="2000" dirty="0">
+                <a:solidFill>
+                  <a:schemeClr val="bg1"/>
+                </a:solidFill>
+                <a:latin typeface="Avenir Next" panose="020B0503020202020204" pitchFamily="34" charset="0"/>
+              </a:rPr>
+            </a:br>
             <a:endParaRPr lang="en-US" sz="2000" dirty="0">
               <a:solidFill>
                 <a:schemeClr val="bg1"/>
@@ -4019,7 +3954,7 @@
           <a:lstStyle/>
           <a:p>
             <a:r>
-              <a:rPr lang="en-US" sz="5400" b="1" dirty="0" smtClean="0">
+              <a:rPr lang="en-US" sz="5400" b="1" dirty="0">
                 <a:solidFill>
                   <a:schemeClr val="bg1"/>
                 </a:solidFill>
@@ -4027,12 +3962,6 @@
               </a:rPr>
               <a:t>Hosting &amp; helping LC </a:t>
             </a:r>
-            <a:endParaRPr lang="en-US" sz="5400" b="1" dirty="0">
-              <a:solidFill>
-                <a:schemeClr val="bg1"/>
-              </a:solidFill>
-              <a:latin typeface="Avenir Next Demi Bold" panose="020B0503020202020204" pitchFamily="34" charset="0"/>
-            </a:endParaRPr>
           </a:p>
         </p:txBody>
       </p:sp>
@@ -4069,7 +3998,7 @@
                 <a:solidFill>
                   <a:schemeClr val="bg1"/>
                 </a:solidFill>
-                <a:latin typeface="Avenir Next Medium" panose="020B0503020202020204" pitchFamily="34" charset="0"/>
+                <a:latin typeface="Avenir Next Ultra Light" panose="020B0203020202020204" pitchFamily="34" charset="77"/>
               </a:rPr>
               <a:t>MAC 2021</a:t>
             </a:r>
@@ -4149,7 +4078,7 @@
           <a:lstStyle/>
           <a:p>
             <a:r>
-              <a:rPr lang="en-US" sz="5400" b="1" dirty="0" smtClean="0">
+              <a:rPr lang="en-US" sz="5400" b="1" dirty="0">
                 <a:solidFill>
                   <a:schemeClr val="bg1"/>
                 </a:solidFill>
@@ -4157,12 +4086,6 @@
               </a:rPr>
               <a:t>Self-hosting &amp; teaching LC</a:t>
             </a:r>
-            <a:endParaRPr lang="en-US" sz="5400" b="1" dirty="0">
-              <a:solidFill>
-                <a:schemeClr val="bg1"/>
-              </a:solidFill>
-              <a:latin typeface="Avenir Next Demi Bold" panose="020B0503020202020204" pitchFamily="34" charset="0"/>
-            </a:endParaRPr>
           </a:p>
         </p:txBody>
       </p:sp>
@@ -4199,7 +4122,7 @@
                 <a:solidFill>
                   <a:schemeClr val="bg1"/>
                 </a:solidFill>
-                <a:latin typeface="Avenir Next Medium" panose="020B0503020202020204" pitchFamily="34" charset="0"/>
+                <a:latin typeface="Avenir Next Ultra Light" panose="020B0203020202020204" pitchFamily="34" charset="77"/>
               </a:rPr>
               <a:t>MAC 2021</a:t>
             </a:r>
@@ -4245,16 +4168,7 @@
                 </a:solidFill>
                 <a:latin typeface="Avenir Next" panose="020B0503020202020204" pitchFamily="34" charset="0"/>
               </a:rPr>
-              <a:t>3 in-house certified LC </a:t>
-            </a:r>
-            <a:r>
-              <a:rPr lang="en-US" sz="2000" dirty="0" smtClean="0">
-                <a:solidFill>
-                  <a:schemeClr val="bg1"/>
-                </a:solidFill>
-                <a:latin typeface="Avenir Next" panose="020B0503020202020204" pitchFamily="34" charset="0"/>
-              </a:rPr>
-              <a:t>instructors with history of collaboration</a:t>
+              <a:t>3 in-house certified LC instructors with history of collaboration</a:t>
             </a:r>
           </a:p>
           <a:p>
@@ -4275,13 +4189,13 @@
               <a:buChar char="•"/>
             </a:pPr>
             <a:r>
-              <a:rPr lang="en-US" sz="2000" dirty="0" smtClean="0">
+              <a:rPr lang="en-US" sz="2000" dirty="0">
                 <a:solidFill>
                   <a:schemeClr val="bg1"/>
                 </a:solidFill>
                 <a:latin typeface="Avenir Next" panose="020B0503020202020204" pitchFamily="34" charset="0"/>
               </a:rPr>
-              <a:t>More control over:</a:t>
+              <a:t>More control over</a:t>
             </a:r>
           </a:p>
           <a:p>
@@ -4290,7 +4204,7 @@
               <a:buChar char="•"/>
             </a:pPr>
             <a:r>
-              <a:rPr lang="en-US" sz="2000" dirty="0" smtClean="0">
+              <a:rPr lang="en-US" sz="2000" dirty="0">
                 <a:solidFill>
                   <a:schemeClr val="bg1"/>
                 </a:solidFill>
@@ -4305,7 +4219,7 @@
               <a:buChar char="•"/>
             </a:pPr>
             <a:r>
-              <a:rPr lang="en-US" sz="2000" dirty="0" smtClean="0">
+              <a:rPr lang="en-US" sz="2000" dirty="0">
                 <a:solidFill>
                   <a:schemeClr val="bg1"/>
                 </a:solidFill>
@@ -4320,7 +4234,7 @@
               <a:buChar char="•"/>
             </a:pPr>
             <a:r>
-              <a:rPr lang="en-US" sz="2000" dirty="0" smtClean="0">
+              <a:rPr lang="en-US" sz="2000" dirty="0">
                 <a:solidFill>
                   <a:schemeClr val="bg1"/>
                 </a:solidFill>
@@ -4334,33 +4248,27 @@
               <a:buFont typeface="Arial" panose="020B0604020202020204" pitchFamily="34" charset="0"/>
               <a:buChar char="•"/>
             </a:pPr>
-            <a:endParaRPr lang="en-US" sz="2000" dirty="0" smtClean="0">
-              <a:solidFill>
-                <a:schemeClr val="bg1"/>
-              </a:solidFill>
-              <a:latin typeface="Avenir Next" panose="020B0503020202020204" pitchFamily="34" charset="0"/>
-            </a:endParaRPr>
-          </a:p>
-          <a:p>
-            <a:pPr marL="342900" indent="-342900">
-              <a:buFont typeface="Arial" panose="020B0604020202020204" pitchFamily="34" charset="0"/>
-              <a:buChar char="•"/>
-            </a:pPr>
-            <a:r>
-              <a:rPr lang="en-US" sz="2000" dirty="0" smtClean="0">
-                <a:solidFill>
-                  <a:schemeClr val="bg1"/>
-                </a:solidFill>
-                <a:latin typeface="Avenir Next" panose="020B0503020202020204" pitchFamily="34" charset="0"/>
-              </a:rPr>
-              <a:t>No fee paid to the central Carpentries organization (approx. $XXX HOW MUCH WAS IT?)</a:t>
-            </a:r>
             <a:endParaRPr lang="en-US" sz="2000" dirty="0">
               <a:solidFill>
                 <a:schemeClr val="bg1"/>
               </a:solidFill>
               <a:latin typeface="Avenir Next" panose="020B0503020202020204" pitchFamily="34" charset="0"/>
             </a:endParaRPr>
+          </a:p>
+          <a:p>
+            <a:pPr marL="342900" indent="-342900">
+              <a:buFont typeface="Arial" panose="020B0604020202020204" pitchFamily="34" charset="0"/>
+              <a:buChar char="•"/>
+            </a:pPr>
+            <a:r>
+              <a:rPr lang="en-US" sz="2000" dirty="0">
+                <a:solidFill>
+                  <a:schemeClr val="bg1"/>
+                </a:solidFill>
+                <a:latin typeface="Avenir Next" panose="020B0503020202020204" pitchFamily="34" charset="0"/>
+              </a:rPr>
+              <a:t>No fee paid to the central Carpentries organization (approx. $XXX HOW MUCH WAS IT?)</a:t>
+            </a:r>
           </a:p>
         </p:txBody>
       </p:sp>
@@ -4492,16 +4400,10 @@
                 <a:solidFill>
                   <a:schemeClr val="bg1"/>
                 </a:solidFill>
-                <a:latin typeface="Avenir Next Medium" panose="020B0503020202020204" pitchFamily="34" charset="0"/>
+                <a:latin typeface="Avenir Next" panose="020B0503020202020204" pitchFamily="34" charset="0"/>
               </a:rPr>
               <a:t>This project has been funded in whole or in part with Federal funds from the National Library of Medicine, National Institutes of Health, Department of Health and Human Services, under Cooperative Agreement Number UG4LM013724 with the University of Maryland, Baltimore.</a:t>
             </a:r>
-            <a:endParaRPr lang="en-US" sz="1600" i="1" dirty="0">
-              <a:solidFill>
-                <a:schemeClr val="bg1"/>
-              </a:solidFill>
-              <a:latin typeface="Avenir Next Medium" panose="020B0503020202020204" pitchFamily="34" charset="0"/>
-            </a:endParaRPr>
           </a:p>
         </p:txBody>
       </p:sp>
@@ -4538,7 +4440,7 @@
                 <a:solidFill>
                   <a:schemeClr val="bg1"/>
                 </a:solidFill>
-                <a:latin typeface="Avenir Next Medium" panose="020B0503020202020204" pitchFamily="34" charset="0"/>
+                <a:latin typeface="Avenir Next Ultra Light" panose="020B0203020202020204" pitchFamily="34" charset="77"/>
               </a:rPr>
               <a:t>MAC 2021</a:t>
             </a:r>
@@ -4573,7 +4475,7 @@
         </p:blipFill>
         <p:spPr>
           <a:xfrm>
-            <a:off x="5075411" y="3531834"/>
+            <a:off x="5064778" y="3542467"/>
             <a:ext cx="3802912" cy="610149"/>
           </a:xfrm>
           <a:prstGeom prst="rect">

</xml_diff>

<commit_message>
JPC updated slide 04 with some words. ready for final review by others.
</commit_message>
<xml_diff>
--- a/slides.pptx
+++ b/slides.pptx
@@ -4144,7 +4144,7 @@
         <p:spPr>
           <a:xfrm>
             <a:off x="689344" y="1591841"/>
-            <a:ext cx="10813312" cy="2554545"/>
+            <a:ext cx="10813312" cy="2862322"/>
           </a:xfrm>
           <a:prstGeom prst="rect">
             <a:avLst/>
@@ -4168,7 +4168,37 @@
                 </a:solidFill>
                 <a:latin typeface="Avenir Next" panose="020B0503020202020204" pitchFamily="34" charset="0"/>
               </a:rPr>
-              <a:t>3 in-house certified LC instructors with history of collaboration</a:t>
+              <a:t>NNLM sponsored Carpentries Instructor training building its network of certified instructors and capacity to self-organize carpentries workshops. </a:t>
+            </a:r>
+          </a:p>
+          <a:p>
+            <a:pPr marL="342900" indent="-342900">
+              <a:buFont typeface="Arial" panose="020B0604020202020204" pitchFamily="34" charset="0"/>
+              <a:buChar char="•"/>
+            </a:pPr>
+            <a:r>
+              <a:rPr lang="en-US" sz="2000" dirty="0">
+                <a:solidFill>
+                  <a:schemeClr val="bg1"/>
+                </a:solidFill>
+                <a:latin typeface="Avenir Next" panose="020B0503020202020204" pitchFamily="34" charset="0"/>
+              </a:rPr>
+              <a:t>HSHSL built its capacity with 3 in-house staff gaining LC instructor certification.</a:t>
+            </a:r>
+          </a:p>
+          <a:p>
+            <a:pPr marL="342900" indent="-342900">
+              <a:buFont typeface="Arial" panose="020B0604020202020204" pitchFamily="34" charset="0"/>
+              <a:buChar char="•"/>
+            </a:pPr>
+            <a:r>
+              <a:rPr lang="en-US" sz="2000" dirty="0">
+                <a:solidFill>
+                  <a:schemeClr val="bg1"/>
+                </a:solidFill>
+                <a:latin typeface="Avenir Next" panose="020B0503020202020204" pitchFamily="34" charset="0"/>
+              </a:rPr>
+              <a:t>More control over</a:t>
             </a:r>
           </a:p>
           <a:p>
@@ -4176,99 +4206,90 @@
               <a:buFont typeface="Arial" panose="020B0604020202020204" pitchFamily="34" charset="0"/>
               <a:buChar char="•"/>
             </a:pPr>
+            <a:r>
+              <a:rPr lang="en-US" sz="2000" dirty="0">
+                <a:solidFill>
+                  <a:schemeClr val="bg1"/>
+                </a:solidFill>
+                <a:latin typeface="Avenir Next" panose="020B0503020202020204" pitchFamily="34" charset="0"/>
+              </a:rPr>
+              <a:t>administrative timelines</a:t>
+            </a:r>
+          </a:p>
+          <a:p>
+            <a:pPr marL="800100" lvl="1" indent="-342900">
+              <a:buFont typeface="Arial" panose="020B0604020202020204" pitchFamily="34" charset="0"/>
+              <a:buChar char="•"/>
+            </a:pPr>
+            <a:r>
+              <a:rPr lang="en-US" sz="2000" dirty="0">
+                <a:solidFill>
+                  <a:schemeClr val="bg1"/>
+                </a:solidFill>
+                <a:latin typeface="Avenir Next" panose="020B0503020202020204" pitchFamily="34" charset="0"/>
+              </a:rPr>
+              <a:t>promotion timeline</a:t>
+            </a:r>
+          </a:p>
+          <a:p>
+            <a:pPr marL="800100" lvl="1" indent="-342900">
+              <a:buFont typeface="Arial" panose="020B0604020202020204" pitchFamily="34" charset="0"/>
+              <a:buChar char="•"/>
+            </a:pPr>
+            <a:r>
+              <a:rPr lang="en-US" sz="2000" dirty="0">
+                <a:solidFill>
+                  <a:schemeClr val="bg1"/>
+                </a:solidFill>
+                <a:latin typeface="Avenir Next" panose="020B0503020202020204" pitchFamily="34" charset="0"/>
+              </a:rPr>
+              <a:t>instructor buy-in</a:t>
+            </a:r>
+          </a:p>
+          <a:p>
+            <a:pPr marL="800100" lvl="1" indent="-342900">
+              <a:buFont typeface="Arial" panose="020B0604020202020204" pitchFamily="34" charset="0"/>
+              <a:buChar char="•"/>
+            </a:pPr>
+            <a:r>
+              <a:rPr lang="en-US" sz="2000" dirty="0">
+                <a:solidFill>
+                  <a:schemeClr val="bg1"/>
+                </a:solidFill>
+                <a:latin typeface="Avenir Next" panose="020B0503020202020204" pitchFamily="34" charset="0"/>
+              </a:rPr>
+              <a:t>curriculum </a:t>
+            </a:r>
+          </a:p>
+          <a:p>
+            <a:pPr marL="342900" indent="-342900">
+              <a:buFont typeface="Arial" panose="020B0604020202020204" pitchFamily="34" charset="0"/>
+              <a:buChar char="•"/>
+            </a:pPr>
+            <a:r>
+              <a:rPr lang="en-US" sz="2000" dirty="0">
+                <a:solidFill>
+                  <a:schemeClr val="bg1"/>
+                </a:solidFill>
+                <a:latin typeface="Avenir Next" panose="020B0503020202020204" pitchFamily="34" charset="0"/>
+              </a:rPr>
+              <a:t>No fee paid to the central </a:t>
+            </a:r>
+            <a:r>
+              <a:rPr lang="en-US" sz="2000">
+                <a:solidFill>
+                  <a:schemeClr val="bg1"/>
+                </a:solidFill>
+                <a:latin typeface="Avenir Next" panose="020B0503020202020204" pitchFamily="34" charset="0"/>
+              </a:rPr>
+              <a:t>Carpentries organization</a:t>
+            </a:r>
             <a:endParaRPr lang="en-US" sz="2000" dirty="0">
               <a:solidFill>
                 <a:schemeClr val="bg1"/>
               </a:solidFill>
               <a:latin typeface="Avenir Next" panose="020B0503020202020204" pitchFamily="34" charset="0"/>
             </a:endParaRPr>
-          </a:p>
-          <a:p>
-            <a:pPr marL="342900" indent="-342900">
-              <a:buFont typeface="Arial" panose="020B0604020202020204" pitchFamily="34" charset="0"/>
-              <a:buChar char="•"/>
-            </a:pPr>
-            <a:r>
-              <a:rPr lang="en-US" sz="2000" dirty="0">
-                <a:solidFill>
-                  <a:schemeClr val="bg1"/>
-                </a:solidFill>
-                <a:latin typeface="Avenir Next" panose="020B0503020202020204" pitchFamily="34" charset="0"/>
-              </a:rPr>
-              <a:t>More control over</a:t>
-            </a:r>
-          </a:p>
-          <a:p>
-            <a:pPr marL="800100" lvl="1" indent="-342900">
-              <a:buFont typeface="Arial" panose="020B0604020202020204" pitchFamily="34" charset="0"/>
-              <a:buChar char="•"/>
-            </a:pPr>
-            <a:r>
-              <a:rPr lang="en-US" sz="2000" dirty="0">
-                <a:solidFill>
-                  <a:schemeClr val="bg1"/>
-                </a:solidFill>
-                <a:latin typeface="Avenir Next" panose="020B0503020202020204" pitchFamily="34" charset="0"/>
-              </a:rPr>
-              <a:t>administrative timelines</a:t>
-            </a:r>
-          </a:p>
-          <a:p>
-            <a:pPr marL="800100" lvl="1" indent="-342900">
-              <a:buFont typeface="Arial" panose="020B0604020202020204" pitchFamily="34" charset="0"/>
-              <a:buChar char="•"/>
-            </a:pPr>
-            <a:r>
-              <a:rPr lang="en-US" sz="2000" dirty="0">
-                <a:solidFill>
-                  <a:schemeClr val="bg1"/>
-                </a:solidFill>
-                <a:latin typeface="Avenir Next" panose="020B0503020202020204" pitchFamily="34" charset="0"/>
-              </a:rPr>
-              <a:t>promotion timeline</a:t>
-            </a:r>
-          </a:p>
-          <a:p>
-            <a:pPr marL="800100" lvl="1" indent="-342900">
-              <a:buFont typeface="Arial" panose="020B0604020202020204" pitchFamily="34" charset="0"/>
-              <a:buChar char="•"/>
-            </a:pPr>
-            <a:r>
-              <a:rPr lang="en-US" sz="2000" dirty="0">
-                <a:solidFill>
-                  <a:schemeClr val="bg1"/>
-                </a:solidFill>
-                <a:latin typeface="Avenir Next" panose="020B0503020202020204" pitchFamily="34" charset="0"/>
-              </a:rPr>
-              <a:t>instructor buy-in</a:t>
-            </a:r>
-          </a:p>
-          <a:p>
-            <a:pPr marL="342900" indent="-342900">
-              <a:buFont typeface="Arial" panose="020B0604020202020204" pitchFamily="34" charset="0"/>
-              <a:buChar char="•"/>
-            </a:pPr>
-            <a:endParaRPr lang="en-US" sz="2000" dirty="0">
-              <a:solidFill>
-                <a:schemeClr val="bg1"/>
-              </a:solidFill>
-              <a:latin typeface="Avenir Next" panose="020B0503020202020204" pitchFamily="34" charset="0"/>
-            </a:endParaRPr>
-          </a:p>
-          <a:p>
-            <a:pPr marL="342900" indent="-342900">
-              <a:buFont typeface="Arial" panose="020B0604020202020204" pitchFamily="34" charset="0"/>
-              <a:buChar char="•"/>
-            </a:pPr>
-            <a:r>
-              <a:rPr lang="en-US" sz="2000" dirty="0">
-                <a:solidFill>
-                  <a:schemeClr val="bg1"/>
-                </a:solidFill>
-                <a:latin typeface="Avenir Next" panose="020B0503020202020204" pitchFamily="34" charset="0"/>
-              </a:rPr>
-              <a:t>No fee paid to the central Carpentries organization (approx. $XXX HOW MUCH WAS IT?)</a:t>
-            </a:r>
           </a:p>
         </p:txBody>
       </p:sp>

</xml_diff>